<commit_message>
added keywords to ML slide, and listed engines used in linreg by parsnip
</commit_message>
<xml_diff>
--- a/workshop.pptx
+++ b/workshop.pptx
@@ -5,7 +5,7 @@
     <p:sldMasterId id="2147483648" r:id="rId1"/>
   </p:sldMasterIdLst>
   <p:notesMasterIdLst>
-    <p:notesMasterId r:id="rId15"/>
+    <p:notesMasterId r:id="rId18"/>
   </p:notesMasterIdLst>
   <p:sldIdLst>
     <p:sldId id="256" r:id="rId4"/>
@@ -19,6 +19,9 @@
     <p:sldId id="264" r:id="rId12"/>
     <p:sldId id="265" r:id="rId13"/>
     <p:sldId id="266" r:id="rId14"/>
+    <p:sldId id="267" r:id="rId15"/>
+    <p:sldId id="268" r:id="rId16"/>
+    <p:sldId id="269" r:id="rId17"/>
   </p:sldIdLst>
   <p:sldSz cx="9144000" cy="6858000" type="screen4x3"/>
   <p:notesSz cx="6858000" cy="9144000"/>
@@ -144,7 +147,7 @@
       </p:grpSpPr>
       <p:sp>
         <p:nvSpPr>
-          <p:cNvPr id="1732849313" name="Header Placeholder 1"/>
+          <p:cNvPr id="1202378159" name="Header Placeholder 1"/>
           <p:cNvSpPr>
             <a:spLocks noGrp="1"/>
           </p:cNvSpPr>
@@ -178,7 +181,7 @@
       </p:sp>
       <p:sp>
         <p:nvSpPr>
-          <p:cNvPr id="1495058935" name="Date Placeholder 2"/>
+          <p:cNvPr id="1748104133" name="Date Placeholder 2"/>
           <p:cNvSpPr>
             <a:spLocks noGrp="1"/>
           </p:cNvSpPr>
@@ -212,7 +215,7 @@
       </p:sp>
       <p:sp>
         <p:nvSpPr>
-          <p:cNvPr id="705641868" name="Date Placeholder 2"/>
+          <p:cNvPr id="1491385203" name="Date Placeholder 2"/>
           <p:cNvSpPr>
             <a:spLocks noGrp="1"/>
           </p:cNvSpPr>
@@ -246,7 +249,7 @@
       </p:sp>
       <p:sp>
         <p:nvSpPr>
-          <p:cNvPr id="187145238" name="Notes Placeholder 4"/>
+          <p:cNvPr id="1724304891" name="Notes Placeholder 4"/>
           <p:cNvSpPr>
             <a:spLocks noGrp="1"/>
           </p:cNvSpPr>
@@ -276,7 +279,7 @@
       </p:sp>
       <p:sp>
         <p:nvSpPr>
-          <p:cNvPr id="214500637" name="Footer Placeholder 5"/>
+          <p:cNvPr id="1641078369" name="Footer Placeholder 5"/>
           <p:cNvSpPr>
             <a:spLocks noGrp="1"/>
           </p:cNvSpPr>
@@ -310,7 +313,7 @@
       </p:sp>
       <p:sp>
         <p:nvSpPr>
-          <p:cNvPr id="1182659495" name="Slide Number Placeholder 6"/>
+          <p:cNvPr id="16864936" name="Slide Number Placeholder 6"/>
           <p:cNvSpPr>
             <a:spLocks noGrp="1"/>
           </p:cNvSpPr>
@@ -459,7 +462,7 @@
       </p:grpSpPr>
       <p:sp>
         <p:nvSpPr>
-          <p:cNvPr id="1565785506" name="Slide Image Placeholder 1"/>
+          <p:cNvPr id="1337479684" name="Slide Image Placeholder 1"/>
           <p:cNvSpPr>
             <a:spLocks noChangeAspect="1" noGrp="1" noRot="1"/>
           </p:cNvSpPr>
@@ -471,7 +474,7 @@
       </p:sp>
       <p:sp>
         <p:nvSpPr>
-          <p:cNvPr id="1385554242" name="Notes Placeholder 2"/>
+          <p:cNvPr id="2050430860" name="Notes Placeholder 2"/>
           <p:cNvSpPr>
             <a:spLocks noGrp="1"/>
           </p:cNvSpPr>
@@ -493,7 +496,7 @@
       </p:sp>
       <p:sp>
         <p:nvSpPr>
-          <p:cNvPr id="1751048273" name="Slide Number Placeholder 3"/>
+          <p:cNvPr id="1337986866" name="Slide Number Placeholder 3"/>
           <p:cNvSpPr>
             <a:spLocks noGrp="1"/>
           </p:cNvSpPr>
@@ -544,7 +547,7 @@
       </p:grpSpPr>
       <p:sp>
         <p:nvSpPr>
-          <p:cNvPr id="87859649" name="Slide Image Placeholder 1"/>
+          <p:cNvPr id="90710353" name="Slide Image Placeholder 1"/>
           <p:cNvSpPr>
             <a:spLocks noChangeAspect="1" noGrp="1" noRot="1"/>
           </p:cNvSpPr>
@@ -556,7 +559,7 @@
       </p:sp>
       <p:sp>
         <p:nvSpPr>
-          <p:cNvPr id="1467641905" name="Notes Placeholder 2"/>
+          <p:cNvPr id="936284240" name="Notes Placeholder 2"/>
           <p:cNvSpPr>
             <a:spLocks noGrp="1"/>
           </p:cNvSpPr>
@@ -578,7 +581,7 @@
       </p:sp>
       <p:sp>
         <p:nvSpPr>
-          <p:cNvPr id="1873360246" name="Slide Number Placeholder 3"/>
+          <p:cNvPr id="1986945459" name="Slide Number Placeholder 3"/>
           <p:cNvSpPr>
             <a:spLocks noGrp="1"/>
           </p:cNvSpPr>
@@ -594,7 +597,7 @@
             <a:pPr>
               <a:defRPr/>
             </a:pPr>
-            <a:fld id="{187521CA-794D-4FBF-BBB2-5C148735C2D0}" type="slidenum">
+            <a:fld id="{9364602B-FE9C-9B66-F3A8-D0D4B8E2B121}" type="slidenum">
               <a:rPr/>
               <a:t/>
             </a:fld>
@@ -629,7 +632,7 @@
       </p:grpSpPr>
       <p:sp>
         <p:nvSpPr>
-          <p:cNvPr id="2010999398" name="Slide Image Placeholder 1"/>
+          <p:cNvPr id="1657285856" name="Slide Image Placeholder 1"/>
           <p:cNvSpPr>
             <a:spLocks noChangeAspect="1" noGrp="1" noRot="1"/>
           </p:cNvSpPr>
@@ -641,7 +644,7 @@
       </p:sp>
       <p:sp>
         <p:nvSpPr>
-          <p:cNvPr id="651786761" name="Notes Placeholder 2"/>
+          <p:cNvPr id="185362688" name="Notes Placeholder 2"/>
           <p:cNvSpPr>
             <a:spLocks noGrp="1"/>
           </p:cNvSpPr>
@@ -663,7 +666,262 @@
       </p:sp>
       <p:sp>
         <p:nvSpPr>
-          <p:cNvPr id="1933492465" name="Slide Number Placeholder 3"/>
+          <p:cNvPr id="10023462" name="Slide Number Placeholder 3"/>
+          <p:cNvSpPr>
+            <a:spLocks noGrp="1"/>
+          </p:cNvSpPr>
+          <p:nvPr>
+            <p:ph type="sldNum" sz="quarter" idx="10"/>
+          </p:nvPr>
+        </p:nvSpPr>
+        <p:spPr bwMode="auto"/>
+        <p:txBody>
+          <a:bodyPr/>
+          <a:lstStyle/>
+          <a:p>
+            <a:pPr>
+              <a:defRPr/>
+            </a:pPr>
+            <a:fld id="{51C75A37-1AF2-78DC-020B-13868E35E477}" type="slidenum">
+              <a:rPr/>
+              <a:t/>
+            </a:fld>
+            <a:endParaRPr/>
+          </a:p>
+        </p:txBody>
+      </p:sp>
+    </p:spTree>
+  </p:cSld>
+  <p:clrMapOvr>
+    <a:masterClrMapping/>
+  </p:clrMapOvr>
+</p:notes>
+</file>
+
+<file path=ppt/notesSlides/notesSlide12.xml><?xml version="1.0" encoding="utf-8"?>
+<p:notes xmlns:a="http://schemas.openxmlformats.org/drawingml/2006/main" xmlns:r="http://schemas.openxmlformats.org/officeDocument/2006/relationships" xmlns:p="http://schemas.openxmlformats.org/presentationml/2006/main" xmlns:m="http://schemas.openxmlformats.org/officeDocument/2006/math" xmlns:w="http://schemas.openxmlformats.org/wordprocessingml/2006/main">
+  <p:cSld name="">
+    <p:spTree>
+      <p:nvGrpSpPr>
+        <p:cNvPr id="1" name=""/>
+        <p:cNvGrpSpPr/>
+        <p:nvPr/>
+      </p:nvGrpSpPr>
+      <p:grpSpPr bwMode="auto">
+        <a:xfrm>
+          <a:off x="0" y="0"/>
+          <a:ext cx="0" cy="0"/>
+          <a:chOff x="0" y="0"/>
+          <a:chExt cx="0" cy="0"/>
+        </a:xfrm>
+      </p:grpSpPr>
+      <p:sp>
+        <p:nvSpPr>
+          <p:cNvPr id="2" name="Slide Image Placeholder 1"/>
+          <p:cNvSpPr>
+            <a:spLocks noChangeAspect="1" noGrp="1" noRot="1"/>
+          </p:cNvSpPr>
+          <p:nvPr>
+            <p:ph type="sldImg"/>
+          </p:nvPr>
+        </p:nvSpPr>
+        <p:spPr bwMode="auto"/>
+      </p:sp>
+      <p:sp>
+        <p:nvSpPr>
+          <p:cNvPr id="3" name="Notes Placeholder 2"/>
+          <p:cNvSpPr>
+            <a:spLocks noGrp="1"/>
+          </p:cNvSpPr>
+          <p:nvPr>
+            <p:ph type="body" idx="1"/>
+          </p:nvPr>
+        </p:nvSpPr>
+        <p:spPr bwMode="auto"/>
+        <p:txBody>
+          <a:bodyPr/>
+          <a:lstStyle/>
+          <a:p>
+            <a:pPr>
+              <a:defRPr/>
+            </a:pPr>
+            <a:endParaRPr/>
+          </a:p>
+        </p:txBody>
+      </p:sp>
+      <p:sp>
+        <p:nvSpPr>
+          <p:cNvPr id="4" name="Slide Number Placeholder 3"/>
+          <p:cNvSpPr>
+            <a:spLocks noGrp="1"/>
+          </p:cNvSpPr>
+          <p:nvPr>
+            <p:ph type="sldNum" sz="quarter" idx="10"/>
+          </p:nvPr>
+        </p:nvSpPr>
+        <p:spPr bwMode="auto"/>
+        <p:txBody>
+          <a:bodyPr/>
+          <a:lstStyle/>
+          <a:p>
+            <a:pPr>
+              <a:defRPr/>
+            </a:pPr>
+            <a:fld id="{70631ACA-70F2-AD2A-E6BB-6D92BBAE6354}" type="slidenum">
+              <a:rPr/>
+              <a:t/>
+            </a:fld>
+            <a:endParaRPr/>
+          </a:p>
+        </p:txBody>
+      </p:sp>
+    </p:spTree>
+  </p:cSld>
+  <p:clrMapOvr>
+    <a:masterClrMapping/>
+  </p:clrMapOvr>
+</p:notes>
+</file>
+
+<file path=ppt/notesSlides/notesSlide13.xml><?xml version="1.0" encoding="utf-8"?>
+<p:notes xmlns:a="http://schemas.openxmlformats.org/drawingml/2006/main" xmlns:r="http://schemas.openxmlformats.org/officeDocument/2006/relationships" xmlns:p="http://schemas.openxmlformats.org/presentationml/2006/main" xmlns:m="http://schemas.openxmlformats.org/officeDocument/2006/math" xmlns:w="http://schemas.openxmlformats.org/wordprocessingml/2006/main">
+  <p:cSld name="">
+    <p:spTree>
+      <p:nvGrpSpPr>
+        <p:cNvPr id="1" name=""/>
+        <p:cNvGrpSpPr/>
+        <p:nvPr/>
+      </p:nvGrpSpPr>
+      <p:grpSpPr bwMode="auto">
+        <a:xfrm>
+          <a:off x="0" y="0"/>
+          <a:ext cx="0" cy="0"/>
+          <a:chOff x="0" y="0"/>
+          <a:chExt cx="0" cy="0"/>
+        </a:xfrm>
+      </p:grpSpPr>
+      <p:sp>
+        <p:nvSpPr>
+          <p:cNvPr id="192892316" name="Slide Image Placeholder 1"/>
+          <p:cNvSpPr>
+            <a:spLocks noChangeAspect="1" noGrp="1" noRot="1"/>
+          </p:cNvSpPr>
+          <p:nvPr>
+            <p:ph type="sldImg"/>
+          </p:nvPr>
+        </p:nvSpPr>
+        <p:spPr bwMode="auto"/>
+      </p:sp>
+      <p:sp>
+        <p:nvSpPr>
+          <p:cNvPr id="25487781" name="Notes Placeholder 2"/>
+          <p:cNvSpPr>
+            <a:spLocks noGrp="1"/>
+          </p:cNvSpPr>
+          <p:nvPr>
+            <p:ph type="body" idx="1"/>
+          </p:nvPr>
+        </p:nvSpPr>
+        <p:spPr bwMode="auto"/>
+        <p:txBody>
+          <a:bodyPr/>
+          <a:lstStyle/>
+          <a:p>
+            <a:pPr>
+              <a:defRPr/>
+            </a:pPr>
+            <a:endParaRPr/>
+          </a:p>
+        </p:txBody>
+      </p:sp>
+      <p:sp>
+        <p:nvSpPr>
+          <p:cNvPr id="570689563" name="Slide Number Placeholder 3"/>
+          <p:cNvSpPr>
+            <a:spLocks noGrp="1"/>
+          </p:cNvSpPr>
+          <p:nvPr>
+            <p:ph type="sldNum" sz="quarter" idx="10"/>
+          </p:nvPr>
+        </p:nvSpPr>
+        <p:spPr bwMode="auto"/>
+        <p:txBody>
+          <a:bodyPr/>
+          <a:lstStyle/>
+          <a:p>
+            <a:pPr>
+              <a:defRPr/>
+            </a:pPr>
+            <a:fld id="{187521CA-794D-4FBF-BBB2-5C148735C2D0}" type="slidenum">
+              <a:rPr/>
+              <a:t/>
+            </a:fld>
+            <a:endParaRPr/>
+          </a:p>
+        </p:txBody>
+      </p:sp>
+    </p:spTree>
+  </p:cSld>
+  <p:clrMapOvr>
+    <a:masterClrMapping/>
+  </p:clrMapOvr>
+</p:notes>
+</file>
+
+<file path=ppt/notesSlides/notesSlide14.xml><?xml version="1.0" encoding="utf-8"?>
+<p:notes xmlns:a="http://schemas.openxmlformats.org/drawingml/2006/main" xmlns:r="http://schemas.openxmlformats.org/officeDocument/2006/relationships" xmlns:p="http://schemas.openxmlformats.org/presentationml/2006/main" xmlns:m="http://schemas.openxmlformats.org/officeDocument/2006/math" xmlns:w="http://schemas.openxmlformats.org/wordprocessingml/2006/main">
+  <p:cSld name="">
+    <p:spTree>
+      <p:nvGrpSpPr>
+        <p:cNvPr id="1" name=""/>
+        <p:cNvGrpSpPr/>
+        <p:nvPr/>
+      </p:nvGrpSpPr>
+      <p:grpSpPr bwMode="auto">
+        <a:xfrm>
+          <a:off x="0" y="0"/>
+          <a:ext cx="0" cy="0"/>
+          <a:chOff x="0" y="0"/>
+          <a:chExt cx="0" cy="0"/>
+        </a:xfrm>
+      </p:grpSpPr>
+      <p:sp>
+        <p:nvSpPr>
+          <p:cNvPr id="953583826" name="Slide Image Placeholder 1"/>
+          <p:cNvSpPr>
+            <a:spLocks noChangeAspect="1" noGrp="1" noRot="1"/>
+          </p:cNvSpPr>
+          <p:nvPr>
+            <p:ph type="sldImg"/>
+          </p:nvPr>
+        </p:nvSpPr>
+        <p:spPr bwMode="auto"/>
+      </p:sp>
+      <p:sp>
+        <p:nvSpPr>
+          <p:cNvPr id="868201301" name="Notes Placeholder 2"/>
+          <p:cNvSpPr>
+            <a:spLocks noGrp="1"/>
+          </p:cNvSpPr>
+          <p:nvPr>
+            <p:ph type="body" idx="1"/>
+          </p:nvPr>
+        </p:nvSpPr>
+        <p:spPr bwMode="auto"/>
+        <p:txBody>
+          <a:bodyPr/>
+          <a:lstStyle/>
+          <a:p>
+            <a:pPr>
+              <a:defRPr/>
+            </a:pPr>
+            <a:endParaRPr/>
+          </a:p>
+        </p:txBody>
+      </p:sp>
+      <p:sp>
+        <p:nvSpPr>
+          <p:cNvPr id="808962075" name="Slide Number Placeholder 3"/>
           <p:cNvSpPr>
             <a:spLocks noGrp="1"/>
           </p:cNvSpPr>
@@ -714,7 +972,7 @@
       </p:grpSpPr>
       <p:sp>
         <p:nvSpPr>
-          <p:cNvPr id="65792561" name="Slide Image Placeholder 1"/>
+          <p:cNvPr id="527501027" name="Slide Image Placeholder 1"/>
           <p:cNvSpPr>
             <a:spLocks noChangeAspect="1" noGrp="1" noRot="1"/>
           </p:cNvSpPr>
@@ -726,7 +984,7 @@
       </p:sp>
       <p:sp>
         <p:nvSpPr>
-          <p:cNvPr id="1845919167" name="Notes Placeholder 2"/>
+          <p:cNvPr id="1398126326" name="Notes Placeholder 2"/>
           <p:cNvSpPr>
             <a:spLocks noGrp="1"/>
           </p:cNvSpPr>
@@ -748,7 +1006,7 @@
       </p:sp>
       <p:sp>
         <p:nvSpPr>
-          <p:cNvPr id="1481348136" name="Slide Number Placeholder 3"/>
+          <p:cNvPr id="2069013371" name="Slide Number Placeholder 3"/>
           <p:cNvSpPr>
             <a:spLocks noGrp="1"/>
           </p:cNvSpPr>
@@ -799,7 +1057,7 @@
       </p:grpSpPr>
       <p:sp>
         <p:nvSpPr>
-          <p:cNvPr id="606964547" name="Slide Image Placeholder 1"/>
+          <p:cNvPr id="2068827369" name="Slide Image Placeholder 1"/>
           <p:cNvSpPr>
             <a:spLocks noChangeAspect="1" noGrp="1" noRot="1"/>
           </p:cNvSpPr>
@@ -811,7 +1069,7 @@
       </p:sp>
       <p:sp>
         <p:nvSpPr>
-          <p:cNvPr id="103756960" name="Notes Placeholder 2"/>
+          <p:cNvPr id="1542577963" name="Notes Placeholder 2"/>
           <p:cNvSpPr>
             <a:spLocks noGrp="1"/>
           </p:cNvSpPr>
@@ -833,7 +1091,7 @@
       </p:sp>
       <p:sp>
         <p:nvSpPr>
-          <p:cNvPr id="285820548" name="Slide Number Placeholder 3"/>
+          <p:cNvPr id="592607416" name="Slide Number Placeholder 3"/>
           <p:cNvSpPr>
             <a:spLocks noGrp="1"/>
           </p:cNvSpPr>
@@ -884,7 +1142,7 @@
       </p:grpSpPr>
       <p:sp>
         <p:nvSpPr>
-          <p:cNvPr id="511537535" name="Slide Image Placeholder 1"/>
+          <p:cNvPr id="785183605" name="Slide Image Placeholder 1"/>
           <p:cNvSpPr>
             <a:spLocks noChangeAspect="1" noGrp="1" noRot="1"/>
           </p:cNvSpPr>
@@ -896,7 +1154,7 @@
       </p:sp>
       <p:sp>
         <p:nvSpPr>
-          <p:cNvPr id="1111817587" name="Notes Placeholder 2"/>
+          <p:cNvPr id="152271854" name="Notes Placeholder 2"/>
           <p:cNvSpPr>
             <a:spLocks noGrp="1"/>
           </p:cNvSpPr>
@@ -918,7 +1176,7 @@
       </p:sp>
       <p:sp>
         <p:nvSpPr>
-          <p:cNvPr id="414927108" name="Slide Number Placeholder 3"/>
+          <p:cNvPr id="1873968457" name="Slide Number Placeholder 3"/>
           <p:cNvSpPr>
             <a:spLocks noGrp="1"/>
           </p:cNvSpPr>
@@ -969,7 +1227,7 @@
       </p:grpSpPr>
       <p:sp>
         <p:nvSpPr>
-          <p:cNvPr id="868204683" name="Slide Image Placeholder 1"/>
+          <p:cNvPr id="1428667821" name="Slide Image Placeholder 1"/>
           <p:cNvSpPr>
             <a:spLocks noChangeAspect="1" noGrp="1" noRot="1"/>
           </p:cNvSpPr>
@@ -981,7 +1239,7 @@
       </p:sp>
       <p:sp>
         <p:nvSpPr>
-          <p:cNvPr id="913055787" name="Notes Placeholder 2"/>
+          <p:cNvPr id="364712225" name="Notes Placeholder 2"/>
           <p:cNvSpPr>
             <a:spLocks noGrp="1"/>
           </p:cNvSpPr>
@@ -1003,7 +1261,7 @@
       </p:sp>
       <p:sp>
         <p:nvSpPr>
-          <p:cNvPr id="1020581280" name="Slide Number Placeholder 3"/>
+          <p:cNvPr id="2069093633" name="Slide Number Placeholder 3"/>
           <p:cNvSpPr>
             <a:spLocks noGrp="1"/>
           </p:cNvSpPr>
@@ -1054,7 +1312,7 @@
       </p:grpSpPr>
       <p:sp>
         <p:nvSpPr>
-          <p:cNvPr id="557515821" name="Slide Image Placeholder 1"/>
+          <p:cNvPr id="2" name="Slide Image Placeholder 1"/>
           <p:cNvSpPr>
             <a:spLocks noChangeAspect="1" noGrp="1" noRot="1"/>
           </p:cNvSpPr>
@@ -1066,7 +1324,7 @@
       </p:sp>
       <p:sp>
         <p:nvSpPr>
-          <p:cNvPr id="87713090" name="Notes Placeholder 2"/>
+          <p:cNvPr id="3" name="Notes Placeholder 2"/>
           <p:cNvSpPr>
             <a:spLocks noGrp="1"/>
           </p:cNvSpPr>
@@ -1088,7 +1346,7 @@
       </p:sp>
       <p:sp>
         <p:nvSpPr>
-          <p:cNvPr id="526569951" name="Slide Number Placeholder 3"/>
+          <p:cNvPr id="4" name="Slide Number Placeholder 3"/>
           <p:cNvSpPr>
             <a:spLocks noGrp="1"/>
           </p:cNvSpPr>
@@ -1104,7 +1362,7 @@
             <a:pPr>
               <a:defRPr/>
             </a:pPr>
-            <a:fld id="{389E1E7D-E555-CF2D-EAD0-C01F9A191D9C}" type="slidenum">
+            <a:fld id="{A36F8BAC-01A1-B3F4-C190-7DC3F676D65B}" type="slidenum">
               <a:rPr/>
               <a:t/>
             </a:fld>
@@ -1139,7 +1397,7 @@
       </p:grpSpPr>
       <p:sp>
         <p:nvSpPr>
-          <p:cNvPr id="1154844112" name="Slide Image Placeholder 1"/>
+          <p:cNvPr id="1381353650" name="Slide Image Placeholder 1"/>
           <p:cNvSpPr>
             <a:spLocks noChangeAspect="1" noGrp="1" noRot="1"/>
           </p:cNvSpPr>
@@ -1151,7 +1409,7 @@
       </p:sp>
       <p:sp>
         <p:nvSpPr>
-          <p:cNvPr id="2073736927" name="Notes Placeholder 2"/>
+          <p:cNvPr id="392015076" name="Notes Placeholder 2"/>
           <p:cNvSpPr>
             <a:spLocks noGrp="1"/>
           </p:cNvSpPr>
@@ -1173,7 +1431,7 @@
       </p:sp>
       <p:sp>
         <p:nvSpPr>
-          <p:cNvPr id="1822978058" name="Slide Number Placeholder 3"/>
+          <p:cNvPr id="1056586470" name="Slide Number Placeholder 3"/>
           <p:cNvSpPr>
             <a:spLocks noGrp="1"/>
           </p:cNvSpPr>
@@ -1189,7 +1447,7 @@
             <a:pPr>
               <a:defRPr/>
             </a:pPr>
-            <a:fld id="{78386BA1-BBB6-941E-A2B1-FDF062AE870E}" type="slidenum">
+            <a:fld id="{389E1E7D-E555-CF2D-EAD0-C01F9A191D9C}" type="slidenum">
               <a:rPr/>
               <a:t/>
             </a:fld>
@@ -1224,7 +1482,7 @@
       </p:grpSpPr>
       <p:sp>
         <p:nvSpPr>
-          <p:cNvPr id="1613222763" name="Slide Image Placeholder 1"/>
+          <p:cNvPr id="1376553345" name="Slide Image Placeholder 1"/>
           <p:cNvSpPr>
             <a:spLocks noChangeAspect="1" noGrp="1" noRot="1"/>
           </p:cNvSpPr>
@@ -1236,7 +1494,7 @@
       </p:sp>
       <p:sp>
         <p:nvSpPr>
-          <p:cNvPr id="382628727" name="Notes Placeholder 2"/>
+          <p:cNvPr id="726686298" name="Notes Placeholder 2"/>
           <p:cNvSpPr>
             <a:spLocks noGrp="1"/>
           </p:cNvSpPr>
@@ -1258,7 +1516,7 @@
       </p:sp>
       <p:sp>
         <p:nvSpPr>
-          <p:cNvPr id="1893665288" name="Slide Number Placeholder 3"/>
+          <p:cNvPr id="1308313186" name="Slide Number Placeholder 3"/>
           <p:cNvSpPr>
             <a:spLocks noGrp="1"/>
           </p:cNvSpPr>
@@ -1274,7 +1532,7 @@
             <a:pPr>
               <a:defRPr/>
             </a:pPr>
-            <a:fld id="{9364602B-FE9C-9B66-F3A8-D0D4B8E2B121}" type="slidenum">
+            <a:fld id="{78386BA1-BBB6-941E-A2B1-FDF062AE870E}" type="slidenum">
               <a:rPr/>
               <a:t/>
             </a:fld>
@@ -1309,7 +1567,7 @@
       </p:grpSpPr>
       <p:sp>
         <p:nvSpPr>
-          <p:cNvPr id="43230722" name="Slide Image Placeholder 1"/>
+          <p:cNvPr id="2" name="Slide Image Placeholder 1"/>
           <p:cNvSpPr>
             <a:spLocks noChangeAspect="1" noGrp="1" noRot="1"/>
           </p:cNvSpPr>
@@ -1321,7 +1579,7 @@
       </p:sp>
       <p:sp>
         <p:nvSpPr>
-          <p:cNvPr id="187412787" name="Notes Placeholder 2"/>
+          <p:cNvPr id="3" name="Notes Placeholder 2"/>
           <p:cNvSpPr>
             <a:spLocks noGrp="1"/>
           </p:cNvSpPr>
@@ -1343,7 +1601,7 @@
       </p:sp>
       <p:sp>
         <p:nvSpPr>
-          <p:cNvPr id="1100580395" name="Slide Number Placeholder 3"/>
+          <p:cNvPr id="4" name="Slide Number Placeholder 3"/>
           <p:cNvSpPr>
             <a:spLocks noGrp="1"/>
           </p:cNvSpPr>
@@ -1359,7 +1617,7 @@
             <a:pPr>
               <a:defRPr/>
             </a:pPr>
-            <a:fld id="{51C75A37-1AF2-78DC-020B-13868E35E477}" type="slidenum">
+            <a:fld id="{6F5DE67A-688E-F26E-2669-109A6FADCB23}" type="slidenum">
               <a:rPr/>
               <a:t/>
             </a:fld>
@@ -1394,7 +1652,7 @@
       </p:grpSpPr>
       <p:sp>
         <p:nvSpPr>
-          <p:cNvPr id="1318395254" name="Title 1"/>
+          <p:cNvPr id="711533935" name="Title 1"/>
           <p:cNvSpPr>
             <a:spLocks noGrp="1"/>
           </p:cNvSpPr>
@@ -1425,7 +1683,7 @@
       </p:sp>
       <p:sp>
         <p:nvSpPr>
-          <p:cNvPr id="975111784" name="Subtitle 2"/>
+          <p:cNvPr id="2101229066" name="Subtitle 2"/>
           <p:cNvSpPr>
             <a:spLocks noGrp="1"/>
           </p:cNvSpPr>
@@ -1547,7 +1805,7 @@
       </p:sp>
       <p:sp>
         <p:nvSpPr>
-          <p:cNvPr id="1298835615" name="Date Placeholder 3"/>
+          <p:cNvPr id="820917693" name="Date Placeholder 3"/>
           <p:cNvSpPr>
             <a:spLocks noGrp="1"/>
           </p:cNvSpPr>
@@ -1573,7 +1831,7 @@
       </p:sp>
       <p:sp>
         <p:nvSpPr>
-          <p:cNvPr id="1170977956" name="Footer Placeholder 4"/>
+          <p:cNvPr id="619911365" name="Footer Placeholder 4"/>
           <p:cNvSpPr>
             <a:spLocks noGrp="1"/>
           </p:cNvSpPr>
@@ -1595,7 +1853,7 @@
       </p:sp>
       <p:sp>
         <p:nvSpPr>
-          <p:cNvPr id="1193355369" name="Slide Number Placeholder 5"/>
+          <p:cNvPr id="2064751984" name="Slide Number Placeholder 5"/>
           <p:cNvSpPr>
             <a:spLocks noGrp="1"/>
           </p:cNvSpPr>
@@ -1646,7 +1904,7 @@
       </p:grpSpPr>
       <p:sp>
         <p:nvSpPr>
-          <p:cNvPr id="1350748876" name="Title 1"/>
+          <p:cNvPr id="354408695" name="Title 1"/>
           <p:cNvSpPr>
             <a:spLocks noGrp="1"/>
           </p:cNvSpPr>
@@ -1672,7 +1930,7 @@
       </p:sp>
       <p:sp>
         <p:nvSpPr>
-          <p:cNvPr id="1957553499" name="Vertical Text Placeholder 2"/>
+          <p:cNvPr id="1737592238" name="Vertical Text Placeholder 2"/>
           <p:cNvSpPr>
             <a:spLocks noGrp="1"/>
           </p:cNvSpPr>
@@ -1738,7 +1996,7 @@
       </p:sp>
       <p:sp>
         <p:nvSpPr>
-          <p:cNvPr id="1161672181" name="Date Placeholder 3"/>
+          <p:cNvPr id="675003952" name="Date Placeholder 3"/>
           <p:cNvSpPr>
             <a:spLocks noGrp="1"/>
           </p:cNvSpPr>
@@ -1764,7 +2022,7 @@
       </p:sp>
       <p:sp>
         <p:nvSpPr>
-          <p:cNvPr id="558233559" name="Footer Placeholder 4"/>
+          <p:cNvPr id="1033586373" name="Footer Placeholder 4"/>
           <p:cNvSpPr>
             <a:spLocks noGrp="1"/>
           </p:cNvSpPr>
@@ -1786,7 +2044,7 @@
       </p:sp>
       <p:sp>
         <p:nvSpPr>
-          <p:cNvPr id="1884436749" name="Slide Number Placeholder 5"/>
+          <p:cNvPr id="556769329" name="Slide Number Placeholder 5"/>
           <p:cNvSpPr>
             <a:spLocks noGrp="1"/>
           </p:cNvSpPr>
@@ -1837,7 +2095,7 @@
       </p:grpSpPr>
       <p:sp>
         <p:nvSpPr>
-          <p:cNvPr id="1518575237" name="Vertical Title 1"/>
+          <p:cNvPr id="1763593622" name="Vertical Title 1"/>
           <p:cNvSpPr>
             <a:spLocks noGrp="1"/>
           </p:cNvSpPr>
@@ -1868,7 +2126,7 @@
       </p:sp>
       <p:sp>
         <p:nvSpPr>
-          <p:cNvPr id="177541477" name="Vertical Text Placeholder 2"/>
+          <p:cNvPr id="1219281909" name="Vertical Text Placeholder 2"/>
           <p:cNvSpPr>
             <a:spLocks noGrp="1"/>
           </p:cNvSpPr>
@@ -1939,7 +2197,7 @@
       </p:sp>
       <p:sp>
         <p:nvSpPr>
-          <p:cNvPr id="1175564421" name="Date Placeholder 3"/>
+          <p:cNvPr id="1890883266" name="Date Placeholder 3"/>
           <p:cNvSpPr>
             <a:spLocks noGrp="1"/>
           </p:cNvSpPr>
@@ -1965,7 +2223,7 @@
       </p:sp>
       <p:sp>
         <p:nvSpPr>
-          <p:cNvPr id="1649960969" name="Footer Placeholder 4"/>
+          <p:cNvPr id="1299727908" name="Footer Placeholder 4"/>
           <p:cNvSpPr>
             <a:spLocks noGrp="1"/>
           </p:cNvSpPr>
@@ -1987,7 +2245,7 @@
       </p:sp>
       <p:sp>
         <p:nvSpPr>
-          <p:cNvPr id="163356541" name="Slide Number Placeholder 5"/>
+          <p:cNvPr id="971066705" name="Slide Number Placeholder 5"/>
           <p:cNvSpPr>
             <a:spLocks noGrp="1"/>
           </p:cNvSpPr>
@@ -2038,7 +2296,7 @@
       </p:grpSpPr>
       <p:sp>
         <p:nvSpPr>
-          <p:cNvPr id="884430353" name="Title 1"/>
+          <p:cNvPr id="30011156" name="Title 1"/>
           <p:cNvSpPr>
             <a:spLocks noGrp="1"/>
           </p:cNvSpPr>
@@ -2064,7 +2322,7 @@
       </p:sp>
       <p:sp>
         <p:nvSpPr>
-          <p:cNvPr id="1030937388" name="Content Placeholder 2"/>
+          <p:cNvPr id="1590632287" name="Content Placeholder 2"/>
           <p:cNvSpPr>
             <a:spLocks noGrp="1"/>
           </p:cNvSpPr>
@@ -2130,7 +2388,7 @@
       </p:sp>
       <p:sp>
         <p:nvSpPr>
-          <p:cNvPr id="1542349051" name="Date Placeholder 3"/>
+          <p:cNvPr id="213262241" name="Date Placeholder 3"/>
           <p:cNvSpPr>
             <a:spLocks noGrp="1"/>
           </p:cNvSpPr>
@@ -2156,7 +2414,7 @@
       </p:sp>
       <p:sp>
         <p:nvSpPr>
-          <p:cNvPr id="227622315" name="Footer Placeholder 4"/>
+          <p:cNvPr id="1990187671" name="Footer Placeholder 4"/>
           <p:cNvSpPr>
             <a:spLocks noGrp="1"/>
           </p:cNvSpPr>
@@ -2178,7 +2436,7 @@
       </p:sp>
       <p:sp>
         <p:nvSpPr>
-          <p:cNvPr id="1367243886" name="Slide Number Placeholder 5"/>
+          <p:cNvPr id="1669105070" name="Slide Number Placeholder 5"/>
           <p:cNvSpPr>
             <a:spLocks noGrp="1"/>
           </p:cNvSpPr>
@@ -2229,7 +2487,7 @@
       </p:grpSpPr>
       <p:sp>
         <p:nvSpPr>
-          <p:cNvPr id="745055031" name="Title 1"/>
+          <p:cNvPr id="745133825" name="Title 1"/>
           <p:cNvSpPr>
             <a:spLocks noGrp="1"/>
           </p:cNvSpPr>
@@ -2264,7 +2522,7 @@
       </p:sp>
       <p:sp>
         <p:nvSpPr>
-          <p:cNvPr id="522364227" name="Text Placeholder 2"/>
+          <p:cNvPr id="1162848610" name="Text Placeholder 2"/>
           <p:cNvSpPr>
             <a:spLocks noGrp="1"/>
           </p:cNvSpPr>
@@ -2386,7 +2644,7 @@
       </p:sp>
       <p:sp>
         <p:nvSpPr>
-          <p:cNvPr id="1903107914" name="Date Placeholder 3"/>
+          <p:cNvPr id="627510287" name="Date Placeholder 3"/>
           <p:cNvSpPr>
             <a:spLocks noGrp="1"/>
           </p:cNvSpPr>
@@ -2412,7 +2670,7 @@
       </p:sp>
       <p:sp>
         <p:nvSpPr>
-          <p:cNvPr id="1126008777" name="Footer Placeholder 4"/>
+          <p:cNvPr id="912002108" name="Footer Placeholder 4"/>
           <p:cNvSpPr>
             <a:spLocks noGrp="1"/>
           </p:cNvSpPr>
@@ -2434,7 +2692,7 @@
       </p:sp>
       <p:sp>
         <p:nvSpPr>
-          <p:cNvPr id="520781066" name="Slide Number Placeholder 5"/>
+          <p:cNvPr id="421122690" name="Slide Number Placeholder 5"/>
           <p:cNvSpPr>
             <a:spLocks noGrp="1"/>
           </p:cNvSpPr>
@@ -2485,7 +2743,7 @@
       </p:grpSpPr>
       <p:sp>
         <p:nvSpPr>
-          <p:cNvPr id="569289252" name="Title 1"/>
+          <p:cNvPr id="1342663225" name="Title 1"/>
           <p:cNvSpPr>
             <a:spLocks noGrp="1"/>
           </p:cNvSpPr>
@@ -2511,7 +2769,7 @@
       </p:sp>
       <p:sp>
         <p:nvSpPr>
-          <p:cNvPr id="158360175" name="Content Placeholder 2"/>
+          <p:cNvPr id="1843097106" name="Content Placeholder 2"/>
           <p:cNvSpPr>
             <a:spLocks noGrp="1"/>
           </p:cNvSpPr>
@@ -2610,7 +2868,7 @@
       </p:sp>
       <p:sp>
         <p:nvSpPr>
-          <p:cNvPr id="383304082" name="Content Placeholder 3"/>
+          <p:cNvPr id="1065431939" name="Content Placeholder 3"/>
           <p:cNvSpPr>
             <a:spLocks noGrp="1"/>
           </p:cNvSpPr>
@@ -2709,7 +2967,7 @@
       </p:sp>
       <p:sp>
         <p:nvSpPr>
-          <p:cNvPr id="565389507" name="Date Placeholder 4"/>
+          <p:cNvPr id="651709110" name="Date Placeholder 4"/>
           <p:cNvSpPr>
             <a:spLocks noGrp="1"/>
           </p:cNvSpPr>
@@ -2735,7 +2993,7 @@
       </p:sp>
       <p:sp>
         <p:nvSpPr>
-          <p:cNvPr id="1963971922" name="Footer Placeholder 5"/>
+          <p:cNvPr id="481534899" name="Footer Placeholder 5"/>
           <p:cNvSpPr>
             <a:spLocks noGrp="1"/>
           </p:cNvSpPr>
@@ -2757,7 +3015,7 @@
       </p:sp>
       <p:sp>
         <p:nvSpPr>
-          <p:cNvPr id="2126179309" name="Slide Number Placeholder 6"/>
+          <p:cNvPr id="60127122" name="Slide Number Placeholder 6"/>
           <p:cNvSpPr>
             <a:spLocks noGrp="1"/>
           </p:cNvSpPr>
@@ -2808,7 +3066,7 @@
       </p:grpSpPr>
       <p:sp>
         <p:nvSpPr>
-          <p:cNvPr id="1321753331" name="Title 1"/>
+          <p:cNvPr id="851741761" name="Title 1"/>
           <p:cNvSpPr>
             <a:spLocks noGrp="1"/>
           </p:cNvSpPr>
@@ -2838,7 +3096,7 @@
       </p:sp>
       <p:sp>
         <p:nvSpPr>
-          <p:cNvPr id="282072427" name="Text Placeholder 2"/>
+          <p:cNvPr id="1941164285" name="Text Placeholder 2"/>
           <p:cNvSpPr>
             <a:spLocks noGrp="1"/>
           </p:cNvSpPr>
@@ -2906,7 +3164,7 @@
       </p:sp>
       <p:sp>
         <p:nvSpPr>
-          <p:cNvPr id="625369297" name="Content Placeholder 3"/>
+          <p:cNvPr id="80934991" name="Content Placeholder 3"/>
           <p:cNvSpPr>
             <a:spLocks noGrp="1"/>
           </p:cNvSpPr>
@@ -3005,7 +3263,7 @@
       </p:sp>
       <p:sp>
         <p:nvSpPr>
-          <p:cNvPr id="326954883" name="Text Placeholder 4"/>
+          <p:cNvPr id="930842647" name="Text Placeholder 4"/>
           <p:cNvSpPr>
             <a:spLocks noGrp="1"/>
           </p:cNvSpPr>
@@ -3073,7 +3331,7 @@
       </p:sp>
       <p:sp>
         <p:nvSpPr>
-          <p:cNvPr id="1410720884" name="Content Placeholder 5"/>
+          <p:cNvPr id="1860321915" name="Content Placeholder 5"/>
           <p:cNvSpPr>
             <a:spLocks noGrp="1"/>
           </p:cNvSpPr>
@@ -3172,7 +3430,7 @@
       </p:sp>
       <p:sp>
         <p:nvSpPr>
-          <p:cNvPr id="214697872" name="Date Placeholder 6"/>
+          <p:cNvPr id="1409875228" name="Date Placeholder 6"/>
           <p:cNvSpPr>
             <a:spLocks noGrp="1"/>
           </p:cNvSpPr>
@@ -3198,7 +3456,7 @@
       </p:sp>
       <p:sp>
         <p:nvSpPr>
-          <p:cNvPr id="1017479859" name="Footer Placeholder 7"/>
+          <p:cNvPr id="1035731969" name="Footer Placeholder 7"/>
           <p:cNvSpPr>
             <a:spLocks noGrp="1"/>
           </p:cNvSpPr>
@@ -3220,7 +3478,7 @@
       </p:sp>
       <p:sp>
         <p:nvSpPr>
-          <p:cNvPr id="586805887" name="Slide Number Placeholder 8"/>
+          <p:cNvPr id="365397374" name="Slide Number Placeholder 8"/>
           <p:cNvSpPr>
             <a:spLocks noGrp="1"/>
           </p:cNvSpPr>
@@ -3271,7 +3529,7 @@
       </p:grpSpPr>
       <p:sp>
         <p:nvSpPr>
-          <p:cNvPr id="916552566" name="Title 1"/>
+          <p:cNvPr id="500493134" name="Title 1"/>
           <p:cNvSpPr>
             <a:spLocks noGrp="1"/>
           </p:cNvSpPr>
@@ -3297,7 +3555,7 @@
       </p:sp>
       <p:sp>
         <p:nvSpPr>
-          <p:cNvPr id="607780279" name="Date Placeholder 2"/>
+          <p:cNvPr id="309015183" name="Date Placeholder 2"/>
           <p:cNvSpPr>
             <a:spLocks noGrp="1"/>
           </p:cNvSpPr>
@@ -3323,7 +3581,7 @@
       </p:sp>
       <p:sp>
         <p:nvSpPr>
-          <p:cNvPr id="321313983" name="Footer Placeholder 3"/>
+          <p:cNvPr id="1917299316" name="Footer Placeholder 3"/>
           <p:cNvSpPr>
             <a:spLocks noGrp="1"/>
           </p:cNvSpPr>
@@ -3345,7 +3603,7 @@
       </p:sp>
       <p:sp>
         <p:nvSpPr>
-          <p:cNvPr id="42904031" name="Slide Number Placeholder 4"/>
+          <p:cNvPr id="815558088" name="Slide Number Placeholder 4"/>
           <p:cNvSpPr>
             <a:spLocks noGrp="1"/>
           </p:cNvSpPr>
@@ -3396,7 +3654,7 @@
       </p:grpSpPr>
       <p:sp>
         <p:nvSpPr>
-          <p:cNvPr id="1845655152" name="Date Placeholder 1"/>
+          <p:cNvPr id="1541834509" name="Date Placeholder 1"/>
           <p:cNvSpPr>
             <a:spLocks noGrp="1"/>
           </p:cNvSpPr>
@@ -3422,7 +3680,7 @@
       </p:sp>
       <p:sp>
         <p:nvSpPr>
-          <p:cNvPr id="448578287" name="Footer Placeholder 2"/>
+          <p:cNvPr id="868682454" name="Footer Placeholder 2"/>
           <p:cNvSpPr>
             <a:spLocks noGrp="1"/>
           </p:cNvSpPr>
@@ -3444,7 +3702,7 @@
       </p:sp>
       <p:sp>
         <p:nvSpPr>
-          <p:cNvPr id="216957370" name="Slide Number Placeholder 3"/>
+          <p:cNvPr id="49843056" name="Slide Number Placeholder 3"/>
           <p:cNvSpPr>
             <a:spLocks noGrp="1"/>
           </p:cNvSpPr>
@@ -3495,7 +3753,7 @@
       </p:grpSpPr>
       <p:sp>
         <p:nvSpPr>
-          <p:cNvPr id="2023336806" name="Title 1"/>
+          <p:cNvPr id="2026722519" name="Title 1"/>
           <p:cNvSpPr>
             <a:spLocks noGrp="1"/>
           </p:cNvSpPr>
@@ -3530,7 +3788,7 @@
       </p:sp>
       <p:sp>
         <p:nvSpPr>
-          <p:cNvPr id="2102230898" name="Content Placeholder 2"/>
+          <p:cNvPr id="269394139" name="Content Placeholder 2"/>
           <p:cNvSpPr>
             <a:spLocks noGrp="1"/>
           </p:cNvSpPr>
@@ -3629,7 +3887,7 @@
       </p:sp>
       <p:sp>
         <p:nvSpPr>
-          <p:cNvPr id="2133185518" name="Text Placeholder 3"/>
+          <p:cNvPr id="1172330492" name="Text Placeholder 3"/>
           <p:cNvSpPr>
             <a:spLocks noGrp="1"/>
           </p:cNvSpPr>
@@ -3697,7 +3955,7 @@
       </p:sp>
       <p:sp>
         <p:nvSpPr>
-          <p:cNvPr id="1348598755" name="Date Placeholder 4"/>
+          <p:cNvPr id="1976247894" name="Date Placeholder 4"/>
           <p:cNvSpPr>
             <a:spLocks noGrp="1"/>
           </p:cNvSpPr>
@@ -3723,7 +3981,7 @@
       </p:sp>
       <p:sp>
         <p:nvSpPr>
-          <p:cNvPr id="1466251274" name="Footer Placeholder 5"/>
+          <p:cNvPr id="2128658986" name="Footer Placeholder 5"/>
           <p:cNvSpPr>
             <a:spLocks noGrp="1"/>
           </p:cNvSpPr>
@@ -3745,7 +4003,7 @@
       </p:sp>
       <p:sp>
         <p:nvSpPr>
-          <p:cNvPr id="1721351679" name="Slide Number Placeholder 6"/>
+          <p:cNvPr id="1701910919" name="Slide Number Placeholder 6"/>
           <p:cNvSpPr>
             <a:spLocks noGrp="1"/>
           </p:cNvSpPr>
@@ -3796,7 +4054,7 @@
       </p:grpSpPr>
       <p:sp>
         <p:nvSpPr>
-          <p:cNvPr id="2083412485" name="Title 1"/>
+          <p:cNvPr id="1400398675" name="Title 1"/>
           <p:cNvSpPr>
             <a:spLocks noGrp="1"/>
           </p:cNvSpPr>
@@ -3831,7 +4089,7 @@
       </p:sp>
       <p:sp>
         <p:nvSpPr>
-          <p:cNvPr id="844543040" name="Picture Placeholder 2"/>
+          <p:cNvPr id="1483833709" name="Picture Placeholder 2"/>
           <p:cNvSpPr>
             <a:spLocks noGrp="1"/>
           </p:cNvSpPr>
@@ -3895,7 +4153,7 @@
       </p:sp>
       <p:sp>
         <p:nvSpPr>
-          <p:cNvPr id="717619357" name="Text Placeholder 3"/>
+          <p:cNvPr id="1524951800" name="Text Placeholder 3"/>
           <p:cNvSpPr>
             <a:spLocks noGrp="1"/>
           </p:cNvSpPr>
@@ -3963,7 +4221,7 @@
       </p:sp>
       <p:sp>
         <p:nvSpPr>
-          <p:cNvPr id="3681127" name="Date Placeholder 4"/>
+          <p:cNvPr id="1728496590" name="Date Placeholder 4"/>
           <p:cNvSpPr>
             <a:spLocks noGrp="1"/>
           </p:cNvSpPr>
@@ -3989,7 +4247,7 @@
       </p:sp>
       <p:sp>
         <p:nvSpPr>
-          <p:cNvPr id="445397627" name="Footer Placeholder 5"/>
+          <p:cNvPr id="1511958722" name="Footer Placeholder 5"/>
           <p:cNvSpPr>
             <a:spLocks noGrp="1"/>
           </p:cNvSpPr>
@@ -4011,7 +4269,7 @@
       </p:sp>
       <p:sp>
         <p:nvSpPr>
-          <p:cNvPr id="1494450199" name="Slide Number Placeholder 6"/>
+          <p:cNvPr id="173504576" name="Slide Number Placeholder 6"/>
           <p:cNvSpPr>
             <a:spLocks noGrp="1"/>
           </p:cNvSpPr>
@@ -4067,7 +4325,7 @@
       </p:grpSpPr>
       <p:sp>
         <p:nvSpPr>
-          <p:cNvPr id="421188739" name="Title Placeholder 1"/>
+          <p:cNvPr id="1801982976" name="Title Placeholder 1"/>
           <p:cNvSpPr>
             <a:spLocks noGrp="1"/>
           </p:cNvSpPr>
@@ -4103,7 +4361,7 @@
       </p:sp>
       <p:sp>
         <p:nvSpPr>
-          <p:cNvPr id="172819109" name="Text Placeholder 2"/>
+          <p:cNvPr id="1672698330" name="Text Placeholder 2"/>
           <p:cNvSpPr>
             <a:spLocks noGrp="1"/>
           </p:cNvSpPr>
@@ -4179,7 +4437,7 @@
       </p:sp>
       <p:sp>
         <p:nvSpPr>
-          <p:cNvPr id="768281111" name="Date Placeholder 3"/>
+          <p:cNvPr id="958386117" name="Date Placeholder 3"/>
           <p:cNvSpPr>
             <a:spLocks noGrp="1"/>
           </p:cNvSpPr>
@@ -4223,7 +4481,7 @@
       </p:sp>
       <p:sp>
         <p:nvSpPr>
-          <p:cNvPr id="284854946" name="Footer Placeholder 4"/>
+          <p:cNvPr id="451367986" name="Footer Placeholder 4"/>
           <p:cNvSpPr>
             <a:spLocks noGrp="1"/>
           </p:cNvSpPr>
@@ -4263,7 +4521,7 @@
       </p:sp>
       <p:sp>
         <p:nvSpPr>
-          <p:cNvPr id="1152010217" name="Slide Number Placeholder 5"/>
+          <p:cNvPr id="2050393082" name="Slide Number Placeholder 5"/>
           <p:cNvSpPr>
             <a:spLocks noGrp="1"/>
           </p:cNvSpPr>
@@ -4593,7 +4851,7 @@
       </p:grpSpPr>
       <p:sp>
         <p:nvSpPr>
-          <p:cNvPr id="951986050" name="Title 1"/>
+          <p:cNvPr id="162581789" name="Title 1"/>
           <p:cNvSpPr>
             <a:spLocks noGrp="1"/>
           </p:cNvSpPr>
@@ -4623,7 +4881,7 @@
       </p:sp>
       <p:sp>
         <p:nvSpPr>
-          <p:cNvPr id="1099207208" name="Subtitle 2"/>
+          <p:cNvPr id="1116928499" name="Subtitle 2"/>
           <p:cNvSpPr>
             <a:spLocks noGrp="1"/>
           </p:cNvSpPr>
@@ -4686,7 +4944,800 @@
       </p:grpSpPr>
       <p:sp>
         <p:nvSpPr>
-          <p:cNvPr id="1299910153" name="Title 1"/>
+          <p:cNvPr id="1024218837" name="Title 1"/>
+          <p:cNvSpPr>
+            <a:spLocks noGrp="1"/>
+          </p:cNvSpPr>
+          <p:nvPr>
+            <p:ph type="title"/>
+          </p:nvPr>
+        </p:nvSpPr>
+        <p:spPr bwMode="auto"/>
+        <p:txBody>
+          <a:bodyPr vertOverflow="overflow" horzOverflow="overflow" vert="horz" wrap="square" lIns="91440" tIns="45720" rIns="91440" bIns="45720" numCol="1" spcCol="0" rtlCol="0" fromWordArt="0" anchor="ctr" anchorCtr="0" forceAA="0" upright="0" compatLnSpc="0">
+            <a:normAutofit fontScale="90000" lnSpcReduction="2000"/>
+          </a:bodyPr>
+          <a:lstStyle/>
+          <a:p>
+            <a:pPr>
+              <a:defRPr/>
+            </a:pPr>
+            <a:r>
+              <a:rPr lang="de-DE"/>
+              <a:t>Demo 1: LinReg – White Wine Quality</a:t>
+            </a:r>
+            <a:endParaRPr/>
+          </a:p>
+        </p:txBody>
+      </p:sp>
+      <p:sp>
+        <p:nvSpPr>
+          <p:cNvPr id="1139468563" name="Content Placeholder 2"/>
+          <p:cNvSpPr>
+            <a:spLocks noGrp="1"/>
+          </p:cNvSpPr>
+          <p:nvPr>
+            <p:ph idx="1"/>
+          </p:nvPr>
+        </p:nvSpPr>
+        <p:spPr bwMode="auto"/>
+        <p:txBody>
+          <a:bodyPr/>
+          <a:lstStyle/>
+          <a:p>
+            <a:pPr>
+              <a:defRPr/>
+            </a:pPr>
+            <a:endParaRPr/>
+          </a:p>
+        </p:txBody>
+      </p:sp>
+    </p:spTree>
+  </p:cSld>
+  <p:clrMapOvr>
+    <a:masterClrMapping/>
+  </p:clrMapOvr>
+  <mc:AlternateContent xmlns:mc="http://schemas.openxmlformats.org/markup-compatibility/2006">
+    <mc:Choice xmlns:p159="http://schemas.microsoft.com/office/powerpoint/2015/09/main" xmlns:p14="http://schemas.microsoft.com/office/powerpoint/2010/main" Requires="p159">
+      <p:transition p14:dur="2000" advClick="1"/>
+    </mc:Choice>
+    <mc:Fallback>
+      <p:transition advClick="1"/>
+    </mc:Fallback>
+  </mc:AlternateContent>
+</p:sld>
+</file>
+
+<file path=ppt/slides/slide11.xml><?xml version="1.0" encoding="utf-8"?>
+<p:sld xmlns:a="http://schemas.openxmlformats.org/drawingml/2006/main" xmlns:r="http://schemas.openxmlformats.org/officeDocument/2006/relationships" xmlns:p="http://schemas.openxmlformats.org/presentationml/2006/main" xmlns:m="http://schemas.openxmlformats.org/officeDocument/2006/math" xmlns:w="http://schemas.openxmlformats.org/wordprocessingml/2006/main" xmlns:mc="http://schemas.openxmlformats.org/markup-compatibility/2006" showMasterPhAnim="0" showMasterSp="1" show="1">
+  <p:cSld name="">
+    <p:spTree>
+      <p:nvGrpSpPr>
+        <p:cNvPr id="1" name=""/>
+        <p:cNvGrpSpPr/>
+        <p:nvPr/>
+      </p:nvGrpSpPr>
+      <p:grpSpPr bwMode="auto">
+        <a:xfrm>
+          <a:off x="0" y="0"/>
+          <a:ext cx="0" cy="0"/>
+          <a:chOff x="0" y="0"/>
+          <a:chExt cx="0" cy="0"/>
+        </a:xfrm>
+      </p:grpSpPr>
+      <p:sp>
+        <p:nvSpPr>
+          <p:cNvPr id="611309448" name="Title 1"/>
+          <p:cNvSpPr>
+            <a:spLocks noGrp="1"/>
+          </p:cNvSpPr>
+          <p:nvPr>
+            <p:ph type="title"/>
+          </p:nvPr>
+        </p:nvSpPr>
+        <p:spPr bwMode="auto"/>
+        <p:txBody>
+          <a:bodyPr vertOverflow="overflow" horzOverflow="overflow" vert="horz" wrap="square" lIns="91440" tIns="45720" rIns="91440" bIns="45720" numCol="1" spcCol="0" rtlCol="0" fromWordArt="0" anchor="ctr" anchorCtr="0" forceAA="0" upright="0" compatLnSpc="0">
+            <a:normAutofit fontScale="90000" lnSpcReduction="2000"/>
+          </a:bodyPr>
+          <a:lstStyle/>
+          <a:p>
+            <a:pPr>
+              <a:defRPr/>
+            </a:pPr>
+            <a:r>
+              <a:rPr lang="de-DE"/>
+              <a:t>Task 1: LinReg - Oktoberfest Detective</a:t>
+            </a:r>
+            <a:endParaRPr/>
+          </a:p>
+        </p:txBody>
+      </p:sp>
+      <p:graphicFrame>
+        <p:nvGraphicFramePr>
+          <p:cNvPr id="1717629603" name=""/>
+          <p:cNvGraphicFramePr>
+            <a:graphicFrameLocks xmlns:a="http://schemas.openxmlformats.org/drawingml/2006/main"/>
+          </p:cNvGraphicFramePr>
+          <p:nvPr/>
+        </p:nvGraphicFramePr>
+        <p:xfrm>
+          <a:off x="1380226" y="1371600"/>
+          <a:ext cx="6108699" cy="3304539"/>
+        </p:xfrm>
+        <a:graphic>
+          <a:graphicData uri="http://schemas.openxmlformats.org/drawingml/2006/table">
+            <a:tbl>
+              <a:tblPr firstRow="1" firstCol="0" lastRow="0" lastCol="0" bandRow="1" bandCol="0">
+                <a:tableStyleId>{5C22544A-7EE6-4342-B048-85BDC9FD1C3A}</a:tableStyleId>
+              </a:tblPr>
+              <a:tblGrid>
+                <a:gridCol w="3047999"/>
+                <a:gridCol w="3047999"/>
+              </a:tblGrid>
+              <a:tr h="365760">
+                <a:tc>
+                  <a:txBody>
+                    <a:bodyPr/>
+                    <a:p>
+                      <a:pPr>
+                        <a:defRPr/>
+                      </a:pPr>
+                      <a:r>
+                        <a:rPr lang="de-DE"/>
+                        <a:t>Columns</a:t>
+                      </a:r>
+                      <a:endParaRPr/>
+                    </a:p>
+                  </a:txBody>
+                  <a:tcPr/>
+                </a:tc>
+                <a:tc>
+                  <a:txBody>
+                    <a:bodyPr/>
+                    <a:p>
+                      <a:pPr>
+                        <a:defRPr/>
+                      </a:pPr>
+                      <a:r>
+                        <a:rPr lang="de-DE"/>
+                        <a:t>Unit</a:t>
+                      </a:r>
+                      <a:endParaRPr/>
+                    </a:p>
+                  </a:txBody>
+                  <a:tcPr/>
+                </a:tc>
+              </a:tr>
+              <a:tr h="365760">
+                <a:tc>
+                  <a:txBody>
+                    <a:bodyPr/>
+                    <a:p>
+                      <a:pPr>
+                        <a:defRPr/>
+                      </a:pPr>
+                      <a:r>
+                        <a:rPr lang="de-DE"/>
+                        <a:t>jahr</a:t>
+                      </a:r>
+                      <a:endParaRPr/>
+                    </a:p>
+                  </a:txBody>
+                  <a:tcPr/>
+                </a:tc>
+                <a:tc>
+                  <a:txBody>
+                    <a:bodyPr/>
+                    <a:p>
+                      <a:pPr>
+                        <a:defRPr/>
+                      </a:pPr>
+                      <a:r>
+                        <a:rPr lang="de-DE"/>
+                        <a:t>-</a:t>
+                      </a:r>
+                      <a:endParaRPr/>
+                    </a:p>
+                  </a:txBody>
+                  <a:tcPr/>
+                </a:tc>
+              </a:tr>
+              <a:tr h="365760">
+                <a:tc>
+                  <a:txBody>
+                    <a:bodyPr/>
+                    <a:p>
+                      <a:pPr>
+                        <a:defRPr/>
+                      </a:pPr>
+                      <a:r>
+                        <a:rPr lang="de-DE"/>
+                        <a:t>dauer</a:t>
+                      </a:r>
+                      <a:endParaRPr/>
+                    </a:p>
+                  </a:txBody>
+                  <a:tcPr/>
+                </a:tc>
+                <a:tc>
+                  <a:txBody>
+                    <a:bodyPr/>
+                    <a:p>
+                      <a:pPr>
+                        <a:defRPr/>
+                      </a:pPr>
+                      <a:r>
+                        <a:rPr lang="de-DE"/>
+                        <a:t>days</a:t>
+                      </a:r>
+                      <a:endParaRPr/>
+                    </a:p>
+                  </a:txBody>
+                  <a:tcPr/>
+                </a:tc>
+              </a:tr>
+              <a:tr h="365760">
+                <a:tc>
+                  <a:txBody>
+                    <a:bodyPr/>
+                    <a:p>
+                      <a:pPr>
+                        <a:defRPr/>
+                      </a:pPr>
+                      <a:r>
+                        <a:rPr lang="de-DE"/>
+                        <a:t>besucher_gesamt</a:t>
+                      </a:r>
+                      <a:endParaRPr/>
+                    </a:p>
+                  </a:txBody>
+                  <a:tcPr/>
+                </a:tc>
+                <a:tc>
+                  <a:txBody>
+                    <a:bodyPr/>
+                    <a:p>
+                      <a:pPr>
+                        <a:defRPr/>
+                      </a:pPr>
+                      <a:r>
+                        <a:rPr lang="de-DE"/>
+                        <a:t>millions</a:t>
+                      </a:r>
+                      <a:endParaRPr/>
+                    </a:p>
+                  </a:txBody>
+                  <a:tcPr/>
+                </a:tc>
+              </a:tr>
+              <a:tr h="365760">
+                <a:tc>
+                  <a:txBody>
+                    <a:bodyPr/>
+                    <a:p>
+                      <a:pPr>
+                        <a:defRPr/>
+                      </a:pPr>
+                      <a:r>
+                        <a:rPr lang="de-DE"/>
+                        <a:t>besucher_tag</a:t>
+                      </a:r>
+                      <a:endParaRPr/>
+                    </a:p>
+                  </a:txBody>
+                  <a:tcPr/>
+                </a:tc>
+                <a:tc>
+                  <a:txBody>
+                    <a:bodyPr/>
+                    <a:p>
+                      <a:pPr>
+                        <a:defRPr/>
+                      </a:pPr>
+                      <a:r>
+                        <a:rPr lang="de-DE"/>
+                        <a:t>thousands</a:t>
+                      </a:r>
+                      <a:endParaRPr/>
+                    </a:p>
+                  </a:txBody>
+                  <a:tcPr/>
+                </a:tc>
+              </a:tr>
+              <a:tr h="365760">
+                <a:tc>
+                  <a:txBody>
+                    <a:bodyPr/>
+                    <a:p>
+                      <a:pPr>
+                        <a:defRPr/>
+                      </a:pPr>
+                      <a:r>
+                        <a:rPr lang="de-DE"/>
+                        <a:t>bier_preis</a:t>
+                      </a:r>
+                      <a:endParaRPr/>
+                    </a:p>
+                  </a:txBody>
+                  <a:tcPr/>
+                </a:tc>
+                <a:tc>
+                  <a:txBody>
+                    <a:bodyPr/>
+                    <a:p>
+                      <a:pPr>
+                        <a:defRPr/>
+                      </a:pPr>
+                      <a:r>
+                        <a:rPr lang="de-DE"/>
+                        <a:t>Euro per 1 Liter</a:t>
+                      </a:r>
+                      <a:endParaRPr/>
+                    </a:p>
+                  </a:txBody>
+                  <a:tcPr/>
+                </a:tc>
+              </a:tr>
+              <a:tr h="365760">
+                <a:tc>
+                  <a:txBody>
+                    <a:bodyPr/>
+                    <a:p>
+                      <a:pPr>
+                        <a:defRPr/>
+                      </a:pPr>
+                      <a:r>
+                        <a:rPr lang="de-DE"/>
+                        <a:t>bier_konsum</a:t>
+                      </a:r>
+                      <a:endParaRPr/>
+                    </a:p>
+                  </a:txBody>
+                  <a:tcPr/>
+                </a:tc>
+                <a:tc>
+                  <a:txBody>
+                    <a:bodyPr/>
+                    <a:p>
+                      <a:pPr>
+                        <a:defRPr/>
+                      </a:pPr>
+                      <a:r>
+                        <a:rPr lang="de-DE"/>
+                        <a:t>hectoliter</a:t>
+                      </a:r>
+                      <a:endParaRPr/>
+                    </a:p>
+                  </a:txBody>
+                  <a:tcPr/>
+                </a:tc>
+              </a:tr>
+              <a:tr h="365760">
+                <a:tc>
+                  <a:txBody>
+                    <a:bodyPr/>
+                    <a:p>
+                      <a:pPr>
+                        <a:defRPr/>
+                      </a:pPr>
+                      <a:r>
+                        <a:rPr lang="de-DE"/>
+                        <a:t>hendl_preis</a:t>
+                      </a:r>
+                      <a:endParaRPr/>
+                    </a:p>
+                  </a:txBody>
+                  <a:tcPr/>
+                </a:tc>
+                <a:tc>
+                  <a:txBody>
+                    <a:bodyPr/>
+                    <a:p>
+                      <a:pPr>
+                        <a:defRPr/>
+                      </a:pPr>
+                      <a:r>
+                        <a:rPr lang="de-DE"/>
+                        <a:t>Euro</a:t>
+                      </a:r>
+                      <a:endParaRPr/>
+                    </a:p>
+                  </a:txBody>
+                  <a:tcPr/>
+                </a:tc>
+              </a:tr>
+              <a:tr h="365760">
+                <a:tc>
+                  <a:txBody>
+                    <a:bodyPr/>
+                    <a:p>
+                      <a:pPr>
+                        <a:defRPr/>
+                      </a:pPr>
+                      <a:r>
+                        <a:rPr lang="de-DE"/>
+                        <a:t>hendl_konsum</a:t>
+                      </a:r>
+                      <a:endParaRPr/>
+                    </a:p>
+                  </a:txBody>
+                  <a:tcPr/>
+                </a:tc>
+                <a:tc>
+                  <a:txBody>
+                    <a:bodyPr/>
+                    <a:p>
+                      <a:pPr>
+                        <a:defRPr/>
+                      </a:pPr>
+                      <a:r>
+                        <a:rPr lang="de-DE"/>
+                        <a:t>count</a:t>
+                      </a:r>
+                      <a:endParaRPr/>
+                    </a:p>
+                  </a:txBody>
+                  <a:tcPr/>
+                </a:tc>
+              </a:tr>
+            </a:tbl>
+          </a:graphicData>
+        </a:graphic>
+      </p:graphicFrame>
+    </p:spTree>
+  </p:cSld>
+  <p:clrMapOvr>
+    <a:masterClrMapping/>
+  </p:clrMapOvr>
+  <mc:AlternateContent xmlns:mc="http://schemas.openxmlformats.org/markup-compatibility/2006">
+    <mc:Choice xmlns:p159="http://schemas.microsoft.com/office/powerpoint/2015/09/main" xmlns:p14="http://schemas.microsoft.com/office/powerpoint/2010/main" Requires="p159">
+      <p:transition p14:dur="2000" advClick="1"/>
+    </mc:Choice>
+    <mc:Fallback>
+      <p:transition advClick="1"/>
+    </mc:Fallback>
+  </mc:AlternateContent>
+</p:sld>
+</file>
+
+<file path=ppt/slides/slide12.xml><?xml version="1.0" encoding="utf-8"?>
+<p:sld xmlns:a="http://schemas.openxmlformats.org/drawingml/2006/main" xmlns:r="http://schemas.openxmlformats.org/officeDocument/2006/relationships" xmlns:p="http://schemas.openxmlformats.org/presentationml/2006/main" xmlns:m="http://schemas.openxmlformats.org/officeDocument/2006/math" xmlns:w="http://schemas.openxmlformats.org/wordprocessingml/2006/main" xmlns:mc="http://schemas.openxmlformats.org/markup-compatibility/2006" showMasterPhAnim="0" showMasterSp="1" show="1">
+  <p:cSld name="">
+    <p:spTree>
+      <p:nvGrpSpPr>
+        <p:cNvPr id="1" name=""/>
+        <p:cNvGrpSpPr/>
+        <p:nvPr/>
+      </p:nvGrpSpPr>
+      <p:grpSpPr bwMode="auto">
+        <a:xfrm>
+          <a:off x="0" y="0"/>
+          <a:ext cx="0" cy="0"/>
+          <a:chOff x="0" y="0"/>
+          <a:chExt cx="0" cy="0"/>
+        </a:xfrm>
+      </p:grpSpPr>
+      <p:sp>
+        <p:nvSpPr>
+          <p:cNvPr id="1946242737" name="Title 1"/>
+          <p:cNvSpPr>
+            <a:spLocks noGrp="1"/>
+          </p:cNvSpPr>
+          <p:nvPr>
+            <p:ph type="title"/>
+          </p:nvPr>
+        </p:nvSpPr>
+        <p:spPr bwMode="auto"/>
+        <p:txBody>
+          <a:bodyPr/>
+          <a:lstStyle/>
+          <a:p>
+            <a:pPr>
+              <a:defRPr/>
+            </a:pPr>
+            <a:r>
+              <a:rPr lang="de-DE"/>
+              <a:t>tidymodels</a:t>
+            </a:r>
+            <a:endParaRPr/>
+          </a:p>
+        </p:txBody>
+      </p:sp>
+      <p:sp>
+        <p:nvSpPr>
+          <p:cNvPr id="1588018890" name=""/>
+          <p:cNvSpPr/>
+          <p:nvPr/>
+        </p:nvSpPr>
+        <p:spPr bwMode="auto">
+          <a:xfrm rot="0" flipH="0" flipV="0">
+            <a:off x="370312" y="2774156"/>
+            <a:ext cx="476249" cy="500062"/>
+          </a:xfrm>
+          <a:prstGeom prst="ellipse">
+            <a:avLst/>
+          </a:prstGeom>
+        </p:spPr>
+        <p:style>
+          <a:lnRef idx="1">
+            <a:schemeClr val="accent1"/>
+          </a:lnRef>
+          <a:fillRef idx="3">
+            <a:schemeClr val="accent1"/>
+          </a:fillRef>
+          <a:effectRef idx="2">
+            <a:schemeClr val="accent1"/>
+          </a:effectRef>
+          <a:fontRef idx="minor">
+            <a:schemeClr val="lt1"/>
+          </a:fontRef>
+        </p:style>
+        <p:txBody>
+          <a:bodyPr vertOverflow="overflow" horzOverflow="overflow" vert="horz" wrap="square" lIns="91440" tIns="45720" rIns="91440" bIns="45720" numCol="1" spcCol="0" rtlCol="0" fromWordArt="0" anchor="ctr" anchorCtr="0" forceAA="0" upright="0" compatLnSpc="0"/>
+          <a:p>
+            <a:pPr>
+              <a:defRPr/>
+            </a:pPr>
+            <a:r>
+              <a:rPr lang="de-DE" sz="2600"/>
+              <a:t>1</a:t>
+            </a:r>
+            <a:endParaRPr sz="2600"/>
+          </a:p>
+        </p:txBody>
+      </p:sp>
+      <p:sp>
+        <p:nvSpPr>
+          <p:cNvPr id="1164676027" name=""/>
+          <p:cNvSpPr/>
+          <p:nvPr/>
+        </p:nvSpPr>
+        <p:spPr bwMode="auto">
+          <a:xfrm rot="0" flipH="0" flipV="0">
+            <a:off x="370312" y="3536156"/>
+            <a:ext cx="476248" cy="500061"/>
+          </a:xfrm>
+          <a:prstGeom prst="ellipse">
+            <a:avLst/>
+          </a:prstGeom>
+        </p:spPr>
+        <p:style>
+          <a:lnRef idx="1">
+            <a:schemeClr val="accent1"/>
+          </a:lnRef>
+          <a:fillRef idx="3">
+            <a:schemeClr val="accent1"/>
+          </a:fillRef>
+          <a:effectRef idx="2">
+            <a:schemeClr val="accent1"/>
+          </a:effectRef>
+          <a:fontRef idx="minor">
+            <a:schemeClr val="lt1"/>
+          </a:fontRef>
+        </p:style>
+        <p:txBody>
+          <a:bodyPr vertOverflow="overflow" horzOverflow="overflow" vert="horz" wrap="square" lIns="91440" tIns="45720" rIns="91440" bIns="45720" numCol="1" spcCol="0" rtlCol="0" fromWordArt="0" anchor="ctr" anchorCtr="0" forceAA="0" upright="0" compatLnSpc="0"/>
+          <a:p>
+            <a:pPr>
+              <a:defRPr/>
+            </a:pPr>
+            <a:r>
+              <a:rPr lang="de-DE" sz="2600"/>
+              <a:t>2</a:t>
+            </a:r>
+            <a:endParaRPr sz="2600"/>
+          </a:p>
+        </p:txBody>
+      </p:sp>
+      <p:sp>
+        <p:nvSpPr>
+          <p:cNvPr id="1597166524" name=""/>
+          <p:cNvSpPr/>
+          <p:nvPr/>
+        </p:nvSpPr>
+        <p:spPr bwMode="auto">
+          <a:xfrm rot="0" flipH="0" flipV="0">
+            <a:off x="370312" y="4307681"/>
+            <a:ext cx="476248" cy="500061"/>
+          </a:xfrm>
+          <a:prstGeom prst="ellipse">
+            <a:avLst/>
+          </a:prstGeom>
+        </p:spPr>
+        <p:style>
+          <a:lnRef idx="1">
+            <a:schemeClr val="accent1"/>
+          </a:lnRef>
+          <a:fillRef idx="3">
+            <a:schemeClr val="accent1"/>
+          </a:fillRef>
+          <a:effectRef idx="2">
+            <a:schemeClr val="accent1"/>
+          </a:effectRef>
+          <a:fontRef idx="minor">
+            <a:schemeClr val="lt1"/>
+          </a:fontRef>
+        </p:style>
+        <p:txBody>
+          <a:bodyPr vertOverflow="overflow" horzOverflow="overflow" vert="horz" wrap="square" lIns="91440" tIns="45720" rIns="91440" bIns="45720" numCol="1" spcCol="0" rtlCol="0" fromWordArt="0" anchor="ctr" anchorCtr="0" forceAA="0" upright="0" compatLnSpc="0"/>
+          <a:p>
+            <a:pPr>
+              <a:defRPr/>
+            </a:pPr>
+            <a:r>
+              <a:rPr lang="de-DE" sz="2600"/>
+              <a:t>3</a:t>
+            </a:r>
+            <a:endParaRPr sz="2600"/>
+          </a:p>
+        </p:txBody>
+      </p:sp>
+      <p:sp>
+        <p:nvSpPr>
+          <p:cNvPr id="259299644" name=""/>
+          <p:cNvSpPr/>
+          <p:nvPr/>
+        </p:nvSpPr>
+        <p:spPr bwMode="auto">
+          <a:xfrm rot="0" flipH="0" flipV="0">
+            <a:off x="370312" y="4962524"/>
+            <a:ext cx="476248" cy="500061"/>
+          </a:xfrm>
+          <a:prstGeom prst="ellipse">
+            <a:avLst/>
+          </a:prstGeom>
+        </p:spPr>
+        <p:style>
+          <a:lnRef idx="1">
+            <a:schemeClr val="accent1"/>
+          </a:lnRef>
+          <a:fillRef idx="3">
+            <a:schemeClr val="accent1"/>
+          </a:fillRef>
+          <a:effectRef idx="2">
+            <a:schemeClr val="accent1"/>
+          </a:effectRef>
+          <a:fontRef idx="minor">
+            <a:schemeClr val="lt1"/>
+          </a:fontRef>
+        </p:style>
+        <p:txBody>
+          <a:bodyPr vertOverflow="overflow" horzOverflow="overflow" vert="horz" wrap="square" lIns="91440" tIns="45720" rIns="91440" bIns="45720" numCol="1" spcCol="0" rtlCol="0" fromWordArt="0" anchor="ctr" anchorCtr="0" forceAA="0" upright="0" compatLnSpc="0"/>
+          <a:p>
+            <a:pPr>
+              <a:defRPr/>
+            </a:pPr>
+            <a:r>
+              <a:rPr lang="de-DE" sz="2600"/>
+              <a:t>4</a:t>
+            </a:r>
+            <a:endParaRPr sz="2600"/>
+          </a:p>
+        </p:txBody>
+      </p:sp>
+      <p:sp>
+        <p:nvSpPr>
+          <p:cNvPr id="912000876" name=""/>
+          <p:cNvSpPr/>
+          <p:nvPr/>
+        </p:nvSpPr>
+        <p:spPr bwMode="auto">
+          <a:xfrm rot="0" flipH="0" flipV="0">
+            <a:off x="334593" y="1345406"/>
+            <a:ext cx="1321593" cy="523874"/>
+          </a:xfrm>
+          <a:prstGeom prst="rect">
+            <a:avLst/>
+          </a:prstGeom>
+        </p:spPr>
+        <p:style>
+          <a:lnRef idx="1">
+            <a:schemeClr val="accent1"/>
+          </a:lnRef>
+          <a:fillRef idx="3">
+            <a:schemeClr val="accent1"/>
+          </a:fillRef>
+          <a:effectRef idx="2">
+            <a:schemeClr val="accent1"/>
+          </a:effectRef>
+          <a:fontRef idx="minor">
+            <a:schemeClr val="lt1"/>
+          </a:fontRef>
+        </p:style>
+        <p:txBody>
+          <a:bodyPr vertOverflow="overflow" horzOverflow="overflow" vert="horz" wrap="square" lIns="91440" tIns="45720" rIns="91440" bIns="45720" numCol="1" spcCol="0" rtlCol="0" fromWordArt="0" anchor="ctr" anchorCtr="0" forceAA="0" upright="0" compatLnSpc="0"/>
+          <a:p>
+            <a:pPr>
+              <a:defRPr/>
+            </a:pPr>
+            <a:r>
+              <a:rPr lang="de-DE" sz="2400"/>
+              <a:t>Problem</a:t>
+            </a:r>
+            <a:endParaRPr sz="2400"/>
+          </a:p>
+        </p:txBody>
+      </p:sp>
+      <p:sp>
+        <p:nvSpPr>
+          <p:cNvPr id="1717573253" name=""/>
+          <p:cNvSpPr/>
+          <p:nvPr/>
+        </p:nvSpPr>
+        <p:spPr bwMode="auto">
+          <a:xfrm rot="0" flipH="0" flipV="0">
+            <a:off x="334593" y="2047875"/>
+            <a:ext cx="1321592" cy="523873"/>
+          </a:xfrm>
+          <a:prstGeom prst="rect">
+            <a:avLst/>
+          </a:prstGeom>
+        </p:spPr>
+        <p:style>
+          <a:lnRef idx="1">
+            <a:schemeClr val="accent1"/>
+          </a:lnRef>
+          <a:fillRef idx="3">
+            <a:schemeClr val="accent1"/>
+          </a:fillRef>
+          <a:effectRef idx="2">
+            <a:schemeClr val="accent1"/>
+          </a:effectRef>
+          <a:fontRef idx="minor">
+            <a:schemeClr val="lt1"/>
+          </a:fontRef>
+        </p:style>
+        <p:txBody>
+          <a:bodyPr vertOverflow="overflow" horzOverflow="overflow" vert="horz" wrap="square" lIns="91440" tIns="45720" rIns="91440" bIns="45720" numCol="1" spcCol="0" rtlCol="0" fromWordArt="0" anchor="ctr" anchorCtr="0" forceAA="0" upright="0" compatLnSpc="0"/>
+          <a:p>
+            <a:pPr>
+              <a:defRPr/>
+            </a:pPr>
+            <a:r>
+              <a:rPr lang="de-DE" sz="2400"/>
+              <a:t>Solution</a:t>
+            </a:r>
+            <a:endParaRPr sz="2400"/>
+          </a:p>
+        </p:txBody>
+      </p:sp>
+    </p:spTree>
+  </p:cSld>
+  <p:clrMapOvr>
+    <a:masterClrMapping/>
+  </p:clrMapOvr>
+  <mc:AlternateContent xmlns:mc="http://schemas.openxmlformats.org/markup-compatibility/2006">
+    <mc:Choice xmlns:p159="http://schemas.microsoft.com/office/powerpoint/2015/09/main" xmlns:p14="http://schemas.microsoft.com/office/powerpoint/2010/main" Requires="p159">
+      <p:transition p14:dur="2000" advClick="1"/>
+    </mc:Choice>
+    <mc:Fallback>
+      <p:transition advClick="1"/>
+    </mc:Fallback>
+  </mc:AlternateContent>
+</p:sld>
+</file>
+
+<file path=ppt/slides/slide13.xml><?xml version="1.0" encoding="utf-8"?>
+<p:sld xmlns:a="http://schemas.openxmlformats.org/drawingml/2006/main" xmlns:r="http://schemas.openxmlformats.org/officeDocument/2006/relationships" xmlns:p="http://schemas.openxmlformats.org/presentationml/2006/main" xmlns:m="http://schemas.openxmlformats.org/officeDocument/2006/math" xmlns:w="http://schemas.openxmlformats.org/wordprocessingml/2006/main" xmlns:mc="http://schemas.openxmlformats.org/markup-compatibility/2006" showMasterPhAnim="0" showMasterSp="1" show="1">
+  <p:cSld name="">
+    <p:spTree>
+      <p:nvGrpSpPr>
+        <p:cNvPr id="1" name=""/>
+        <p:cNvGrpSpPr/>
+        <p:nvPr/>
+      </p:nvGrpSpPr>
+      <p:grpSpPr bwMode="auto">
+        <a:xfrm>
+          <a:off x="0" y="0"/>
+          <a:ext cx="0" cy="0"/>
+          <a:chOff x="0" y="0"/>
+          <a:chExt cx="0" cy="0"/>
+        </a:xfrm>
+      </p:grpSpPr>
+      <p:sp>
+        <p:nvSpPr>
+          <p:cNvPr id="1913519691" name="Title 1"/>
           <p:cNvSpPr>
             <a:spLocks noGrp="1"/>
           </p:cNvSpPr>
@@ -4719,7 +5770,7 @@
       </p:sp>
       <p:sp>
         <p:nvSpPr>
-          <p:cNvPr id="983069307" name="Content Placeholder 2"/>
+          <p:cNvPr id="1825637416" name="Content Placeholder 2"/>
           <p:cNvSpPr>
             <a:spLocks noGrp="1"/>
           </p:cNvSpPr>
@@ -4887,7 +5938,7 @@
 </p:sld>
 </file>
 
-<file path=ppt/slides/slide11.xml><?xml version="1.0" encoding="utf-8"?>
+<file path=ppt/slides/slide14.xml><?xml version="1.0" encoding="utf-8"?>
 <p:sld xmlns:a="http://schemas.openxmlformats.org/drawingml/2006/main" xmlns:r="http://schemas.openxmlformats.org/officeDocument/2006/relationships" xmlns:p="http://schemas.openxmlformats.org/presentationml/2006/main" xmlns:m="http://schemas.openxmlformats.org/officeDocument/2006/math" xmlns:w="http://schemas.openxmlformats.org/wordprocessingml/2006/main" xmlns:mc="http://schemas.openxmlformats.org/markup-compatibility/2006" showMasterPhAnim="0" showMasterSp="1" show="1">
   <p:cSld name="">
     <p:spTree>
@@ -4906,7 +5957,7 @@
       </p:grpSpPr>
       <p:graphicFrame>
         <p:nvGraphicFramePr>
-          <p:cNvPr id="83906639" name=""/>
+          <p:cNvPr id="1895990430" name=""/>
           <p:cNvGraphicFramePr>
             <a:graphicFrameLocks xmlns:a="http://schemas.openxmlformats.org/drawingml/2006/main"/>
           </p:cNvGraphicFramePr>
@@ -7605,7 +8656,7 @@
       </p:grpSpPr>
       <p:sp>
         <p:nvSpPr>
-          <p:cNvPr id="272590986" name="Title 1"/>
+          <p:cNvPr id="1968630766" name="Title 1"/>
           <p:cNvSpPr>
             <a:spLocks noGrp="1"/>
           </p:cNvSpPr>
@@ -7635,7 +8686,7 @@
       </p:sp>
       <p:sp>
         <p:nvSpPr>
-          <p:cNvPr id="506264551" name="Content Placeholder 2"/>
+          <p:cNvPr id="1531617160" name="Content Placeholder 2"/>
           <p:cNvSpPr>
             <a:spLocks noGrp="1"/>
           </p:cNvSpPr>
@@ -7878,7 +8929,7 @@
       </p:grpSpPr>
       <p:sp>
         <p:nvSpPr>
-          <p:cNvPr id="1177785126" name="Title 1"/>
+          <p:cNvPr id="414312826" name="Title 1"/>
           <p:cNvSpPr>
             <a:spLocks noGrp="1"/>
           </p:cNvSpPr>
@@ -7908,7 +8959,7 @@
       </p:sp>
       <p:sp>
         <p:nvSpPr>
-          <p:cNvPr id="922935915" name="Text Placeholder 2"/>
+          <p:cNvPr id="1533933691" name="Text Placeholder 2"/>
           <p:cNvSpPr>
             <a:spLocks noGrp="1"/>
           </p:cNvSpPr>
@@ -7963,7 +9014,7 @@
       </p:grpSpPr>
       <p:graphicFrame>
         <p:nvGraphicFramePr>
-          <p:cNvPr id="1827713318" name=""/>
+          <p:cNvPr id="1531575487" name=""/>
           <p:cNvGraphicFramePr>
             <a:graphicFrameLocks xmlns:a="http://schemas.openxmlformats.org/drawingml/2006/main"/>
           </p:cNvGraphicFramePr>
@@ -8534,7 +9585,7 @@
       </p:grpSpPr>
       <p:sp>
         <p:nvSpPr>
-          <p:cNvPr id="1139227867" name="Title 1"/>
+          <p:cNvPr id="1984532071" name="Title 1"/>
           <p:cNvSpPr>
             <a:spLocks noGrp="1"/>
           </p:cNvSpPr>
@@ -8569,7 +9620,7 @@
       </p:sp>
       <p:sp>
         <p:nvSpPr>
-          <p:cNvPr id="211482585" name="Text Placeholder 2"/>
+          <p:cNvPr id="1430691379" name="Text Placeholder 2"/>
           <p:cNvSpPr>
             <a:spLocks noGrp="1"/>
           </p:cNvSpPr>
@@ -8579,8 +9630,375 @@
         </p:nvSpPr>
         <p:spPr bwMode="auto">
           <a:xfrm flipH="0" flipV="0">
-            <a:off x="722313" y="3845943"/>
-            <a:ext cx="7772400" cy="560954"/>
+            <a:off x="722313" y="2690812"/>
+            <a:ext cx="7772400" cy="1716084"/>
+          </a:xfrm>
+        </p:spPr>
+        <p:txBody>
+          <a:bodyPr vertOverflow="overflow" horzOverflow="overflow" vert="horz" wrap="square" lIns="91440" tIns="45720" rIns="91440" bIns="45720" numCol="1" spcCol="0" rtlCol="0" fromWordArt="0" anchor="b" anchorCtr="0" forceAA="0" upright="0" compatLnSpc="0">
+            <a:normAutofit/>
+          </a:bodyPr>
+          <a:lstStyle>
+            <a:lvl1pPr marL="0" indent="0">
+              <a:buNone/>
+              <a:defRPr sz="2000">
+                <a:solidFill>
+                  <a:schemeClr val="tx1">
+                    <a:tint val="75000"/>
+                  </a:schemeClr>
+                </a:solidFill>
+              </a:defRPr>
+            </a:lvl1pPr>
+            <a:lvl2pPr marL="457200" indent="0">
+              <a:buNone/>
+              <a:defRPr sz="1800">
+                <a:solidFill>
+                  <a:schemeClr val="tx1">
+                    <a:tint val="75000"/>
+                  </a:schemeClr>
+                </a:solidFill>
+              </a:defRPr>
+            </a:lvl2pPr>
+            <a:lvl3pPr marL="914400" indent="0">
+              <a:buNone/>
+              <a:defRPr sz="1600">
+                <a:solidFill>
+                  <a:schemeClr val="tx1">
+                    <a:tint val="75000"/>
+                  </a:schemeClr>
+                </a:solidFill>
+              </a:defRPr>
+            </a:lvl3pPr>
+            <a:lvl4pPr marL="1371600" indent="0">
+              <a:buNone/>
+              <a:defRPr sz="1400">
+                <a:solidFill>
+                  <a:schemeClr val="tx1">
+                    <a:tint val="75000"/>
+                  </a:schemeClr>
+                </a:solidFill>
+              </a:defRPr>
+            </a:lvl4pPr>
+            <a:lvl5pPr marL="1828800" indent="0">
+              <a:buNone/>
+              <a:defRPr sz="1400">
+                <a:solidFill>
+                  <a:schemeClr val="tx1">
+                    <a:tint val="75000"/>
+                  </a:schemeClr>
+                </a:solidFill>
+              </a:defRPr>
+            </a:lvl5pPr>
+            <a:lvl6pPr marL="2286000" indent="0">
+              <a:buNone/>
+              <a:defRPr sz="1400">
+                <a:solidFill>
+                  <a:schemeClr val="tx1">
+                    <a:tint val="75000"/>
+                  </a:schemeClr>
+                </a:solidFill>
+              </a:defRPr>
+            </a:lvl6pPr>
+            <a:lvl7pPr marL="2743200" indent="0">
+              <a:buNone/>
+              <a:defRPr sz="1400">
+                <a:solidFill>
+                  <a:schemeClr val="tx1">
+                    <a:tint val="75000"/>
+                  </a:schemeClr>
+                </a:solidFill>
+              </a:defRPr>
+            </a:lvl7pPr>
+            <a:lvl8pPr marL="3200400" indent="0">
+              <a:buNone/>
+              <a:defRPr sz="1400">
+                <a:solidFill>
+                  <a:schemeClr val="tx1">
+                    <a:tint val="75000"/>
+                  </a:schemeClr>
+                </a:solidFill>
+              </a:defRPr>
+            </a:lvl8pPr>
+            <a:lvl9pPr marL="3657600" indent="0">
+              <a:buNone/>
+              <a:defRPr sz="1400">
+                <a:solidFill>
+                  <a:schemeClr val="tx1">
+                    <a:tint val="75000"/>
+                  </a:schemeClr>
+                </a:solidFill>
+              </a:defRPr>
+            </a:lvl9pPr>
+          </a:lstStyle>
+          <a:p>
+            <a:pPr>
+              <a:defRPr/>
+            </a:pPr>
+            <a:r>
+              <a:rPr lang="de-DE"/>
+              <a:t>What is the purpose?			Target – predictors</a:t>
+            </a:r>
+            <a:endParaRPr lang="de-DE"/>
+          </a:p>
+          <a:p>
+            <a:pPr>
+              <a:defRPr/>
+            </a:pPr>
+            <a:r>
+              <a:rPr lang="de-DE"/>
+              <a:t>What is the </a:t>
+            </a:r>
+            <a:r>
+              <a:rPr lang="de-DE" b="1"/>
+              <a:t>data budget</a:t>
+            </a:r>
+            <a:r>
+              <a:rPr lang="de-DE"/>
+              <a:t>?		Data split</a:t>
+            </a:r>
+            <a:endParaRPr lang="de-DE"/>
+          </a:p>
+          <a:p>
+            <a:pPr>
+              <a:defRPr/>
+            </a:pPr>
+            <a:r>
+              <a:rPr lang="de-DE"/>
+              <a:t>What is the methodology?		Explore – Engineering – Fit – Predict – Eval</a:t>
+            </a:r>
+            <a:endParaRPr/>
+          </a:p>
+        </p:txBody>
+      </p:sp>
+    </p:spTree>
+  </p:cSld>
+  <p:clrMapOvr>
+    <a:masterClrMapping/>
+  </p:clrMapOvr>
+  <mc:AlternateContent xmlns:mc="http://schemas.openxmlformats.org/markup-compatibility/2006">
+    <mc:Choice xmlns:p159="http://schemas.microsoft.com/office/powerpoint/2015/09/main" xmlns:p14="http://schemas.microsoft.com/office/powerpoint/2010/main" Requires="p159">
+      <p:transition p14:dur="2000" advClick="1"/>
+    </mc:Choice>
+    <mc:Fallback>
+      <p:transition advClick="1"/>
+    </mc:Fallback>
+  </mc:AlternateContent>
+</p:sld>
+</file>
+
+<file path=ppt/slides/slide6.xml><?xml version="1.0" encoding="utf-8"?>
+<p:sld xmlns:a="http://schemas.openxmlformats.org/drawingml/2006/main" xmlns:r="http://schemas.openxmlformats.org/officeDocument/2006/relationships" xmlns:p="http://schemas.openxmlformats.org/presentationml/2006/main" xmlns:m="http://schemas.openxmlformats.org/officeDocument/2006/math" xmlns:w="http://schemas.openxmlformats.org/wordprocessingml/2006/main" xmlns:mc="http://schemas.openxmlformats.org/markup-compatibility/2006" showMasterPhAnim="0" showMasterSp="1" show="1">
+  <p:cSld name="">
+    <p:spTree>
+      <p:nvGrpSpPr>
+        <p:cNvPr id="1" name=""/>
+        <p:cNvGrpSpPr/>
+        <p:nvPr/>
+      </p:nvGrpSpPr>
+      <p:grpSpPr bwMode="auto">
+        <a:xfrm>
+          <a:off x="0" y="0"/>
+          <a:ext cx="0" cy="0"/>
+          <a:chOff x="0" y="0"/>
+          <a:chExt cx="0" cy="0"/>
+        </a:xfrm>
+      </p:grpSpPr>
+    </p:spTree>
+  </p:cSld>
+  <p:clrMapOvr>
+    <a:masterClrMapping/>
+  </p:clrMapOvr>
+  <mc:AlternateContent xmlns:mc="http://schemas.openxmlformats.org/markup-compatibility/2006">
+    <mc:Choice xmlns:p159="http://schemas.microsoft.com/office/powerpoint/2015/09/main" xmlns:p14="http://schemas.microsoft.com/office/powerpoint/2010/main" Requires="p159">
+      <p:transition p14:dur="2000" advClick="1"/>
+    </mc:Choice>
+    <mc:Fallback>
+      <p:transition advClick="1"/>
+    </mc:Fallback>
+  </mc:AlternateContent>
+</p:sld>
+</file>
+
+<file path=ppt/slides/slide7.xml><?xml version="1.0" encoding="utf-8"?>
+<p:sld xmlns:a="http://schemas.openxmlformats.org/drawingml/2006/main" xmlns:r="http://schemas.openxmlformats.org/officeDocument/2006/relationships" xmlns:p="http://schemas.openxmlformats.org/presentationml/2006/main" xmlns:m="http://schemas.openxmlformats.org/officeDocument/2006/math" xmlns:w="http://schemas.openxmlformats.org/wordprocessingml/2006/main" xmlns:mc="http://schemas.openxmlformats.org/markup-compatibility/2006" showMasterPhAnim="0" showMasterSp="1" show="1">
+  <p:cSld name="">
+    <p:spTree>
+      <p:nvGrpSpPr>
+        <p:cNvPr id="1" name=""/>
+        <p:cNvGrpSpPr/>
+        <p:nvPr/>
+      </p:nvGrpSpPr>
+      <p:grpSpPr bwMode="auto">
+        <a:xfrm>
+          <a:off x="0" y="0"/>
+          <a:ext cx="0" cy="0"/>
+          <a:chOff x="0" y="0"/>
+          <a:chExt cx="0" cy="0"/>
+        </a:xfrm>
+      </p:grpSpPr>
+      <p:sp>
+        <p:nvSpPr>
+          <p:cNvPr id="1841852878" name="Title 1"/>
+          <p:cNvSpPr>
+            <a:spLocks noGrp="1"/>
+          </p:cNvSpPr>
+          <p:nvPr>
+            <p:ph type="title"/>
+          </p:nvPr>
+        </p:nvSpPr>
+        <p:spPr bwMode="auto"/>
+        <p:txBody>
+          <a:bodyPr/>
+          <a:lstStyle/>
+          <a:p>
+            <a:pPr>
+              <a:defRPr/>
+            </a:pPr>
+            <a:r>
+              <a:rPr lang="de-DE"/>
+              <a:t>Data Split</a:t>
+            </a:r>
+            <a:endParaRPr/>
+          </a:p>
+        </p:txBody>
+      </p:sp>
+      <p:sp>
+        <p:nvSpPr>
+          <p:cNvPr id="130308703" name="Content Placeholder 2"/>
+          <p:cNvSpPr>
+            <a:spLocks noGrp="1"/>
+          </p:cNvSpPr>
+          <p:nvPr>
+            <p:ph idx="1"/>
+          </p:nvPr>
+        </p:nvSpPr>
+        <p:spPr bwMode="auto">
+          <a:xfrm flipH="0" flipV="0">
+            <a:off x="457199" y="1600199"/>
+            <a:ext cx="4114800" cy="4525962"/>
+          </a:xfrm>
+        </p:spPr>
+        <p:txBody>
+          <a:bodyPr/>
+          <a:lstStyle/>
+          <a:p>
+            <a:pPr>
+              <a:defRPr/>
+            </a:pPr>
+            <a:endParaRPr/>
+          </a:p>
+        </p:txBody>
+      </p:sp>
+      <p:sp>
+        <p:nvSpPr>
+          <p:cNvPr id="1192568962" name=""/>
+          <p:cNvSpPr txBox="1"/>
+          <p:nvPr/>
+        </p:nvSpPr>
+        <p:spPr bwMode="auto">
+          <a:xfrm rot="0" flipH="0" flipV="0">
+            <a:off x="4852429" y="1557825"/>
+            <a:ext cx="3757307" cy="366119"/>
+          </a:xfrm>
+          <a:prstGeom prst="rect">
+            <a:avLst/>
+          </a:prstGeom>
+          <a:noFill/>
+        </p:spPr>
+        <p:txBody>
+          <a:bodyPr vertOverflow="overflow" horzOverflow="overflow" vert="horz" wrap="square" lIns="91440" tIns="45720" rIns="91440" bIns="45720" numCol="1" spcCol="0" rtlCol="0" fromWordArt="0" anchor="t" anchorCtr="0" forceAA="0" upright="0" compatLnSpc="0">
+            <a:spAutoFit/>
+          </a:bodyPr>
+          <a:p>
+            <a:pPr>
+              <a:defRPr/>
+            </a:pPr>
+            <a:endParaRPr/>
+          </a:p>
+        </p:txBody>
+      </p:sp>
+    </p:spTree>
+  </p:cSld>
+  <p:clrMapOvr>
+    <a:masterClrMapping/>
+  </p:clrMapOvr>
+  <mc:AlternateContent xmlns:mc="http://schemas.openxmlformats.org/markup-compatibility/2006">
+    <mc:Choice xmlns:p159="http://schemas.microsoft.com/office/powerpoint/2015/09/main" xmlns:p14="http://schemas.microsoft.com/office/powerpoint/2010/main" Requires="p159">
+      <p:transition p14:dur="2000" advClick="1"/>
+    </mc:Choice>
+    <mc:Fallback>
+      <p:transition advClick="1"/>
+    </mc:Fallback>
+  </mc:AlternateContent>
+</p:sld>
+</file>
+
+<file path=ppt/slides/slide8.xml><?xml version="1.0" encoding="utf-8"?>
+<p:sld xmlns:a="http://schemas.openxmlformats.org/drawingml/2006/main" xmlns:r="http://schemas.openxmlformats.org/officeDocument/2006/relationships" xmlns:p="http://schemas.openxmlformats.org/presentationml/2006/main" xmlns:m="http://schemas.openxmlformats.org/officeDocument/2006/math" xmlns:w="http://schemas.openxmlformats.org/wordprocessingml/2006/main" xmlns:mc="http://schemas.openxmlformats.org/markup-compatibility/2006" showMasterPhAnim="0" showMasterSp="1" show="1">
+  <p:cSld name="">
+    <p:spTree>
+      <p:nvGrpSpPr>
+        <p:cNvPr id="1" name=""/>
+        <p:cNvGrpSpPr/>
+        <p:nvPr/>
+      </p:nvGrpSpPr>
+      <p:grpSpPr bwMode="auto">
+        <a:xfrm>
+          <a:off x="0" y="0"/>
+          <a:ext cx="0" cy="0"/>
+          <a:chOff x="0" y="0"/>
+          <a:chExt cx="0" cy="0"/>
+        </a:xfrm>
+      </p:grpSpPr>
+      <p:sp>
+        <p:nvSpPr>
+          <p:cNvPr id="1445483926" name="Title 1"/>
+          <p:cNvSpPr>
+            <a:spLocks noGrp="1"/>
+          </p:cNvSpPr>
+          <p:nvPr>
+            <p:ph type="title"/>
+          </p:nvPr>
+        </p:nvSpPr>
+        <p:spPr bwMode="auto">
+          <a:xfrm>
+            <a:off x="722313" y="4406899"/>
+            <a:ext cx="7772400" cy="1362074"/>
+          </a:xfrm>
+        </p:spPr>
+        <p:txBody>
+          <a:bodyPr/>
+          <a:lstStyle>
+            <a:lvl1pPr algn="l">
+              <a:defRPr sz="4000" b="1" cap="all"/>
+            </a:lvl1pPr>
+          </a:lstStyle>
+          <a:p>
+            <a:pPr>
+              <a:defRPr/>
+            </a:pPr>
+            <a:r>
+              <a:rPr lang="de-DE"/>
+              <a:t>Regression</a:t>
+            </a:r>
+            <a:endParaRPr/>
+          </a:p>
+        </p:txBody>
+      </p:sp>
+      <p:sp>
+        <p:nvSpPr>
+          <p:cNvPr id="1456015682" name="Text Placeholder 2"/>
+          <p:cNvSpPr>
+            <a:spLocks noGrp="1"/>
+          </p:cNvSpPr>
+          <p:nvPr>
+            <p:ph type="body" idx="1"/>
+          </p:nvPr>
+        </p:nvSpPr>
+        <p:spPr bwMode="auto">
+          <a:xfrm>
+            <a:off x="722313" y="2906712"/>
+            <a:ext cx="7772400" cy="1500186"/>
           </a:xfrm>
         </p:spPr>
         <p:txBody>
@@ -8678,306 +10096,6 @@
             </a:lvl9pPr>
           </a:lstStyle>
           <a:p>
-            <a:pPr>
-              <a:defRPr/>
-            </a:pPr>
-            <a:endParaRPr/>
-          </a:p>
-        </p:txBody>
-      </p:sp>
-    </p:spTree>
-  </p:cSld>
-  <p:clrMapOvr>
-    <a:masterClrMapping/>
-  </p:clrMapOvr>
-  <mc:AlternateContent xmlns:mc="http://schemas.openxmlformats.org/markup-compatibility/2006">
-    <mc:Choice xmlns:p159="http://schemas.microsoft.com/office/powerpoint/2015/09/main" xmlns:p14="http://schemas.microsoft.com/office/powerpoint/2010/main" Requires="p159">
-      <p:transition p14:dur="2000" advClick="1"/>
-    </mc:Choice>
-    <mc:Fallback>
-      <p:transition advClick="1"/>
-    </mc:Fallback>
-  </mc:AlternateContent>
-</p:sld>
-</file>
-
-<file path=ppt/slides/slide6.xml><?xml version="1.0" encoding="utf-8"?>
-<p:sld xmlns:a="http://schemas.openxmlformats.org/drawingml/2006/main" xmlns:r="http://schemas.openxmlformats.org/officeDocument/2006/relationships" xmlns:p="http://schemas.openxmlformats.org/presentationml/2006/main" xmlns:m="http://schemas.openxmlformats.org/officeDocument/2006/math" xmlns:w="http://schemas.openxmlformats.org/wordprocessingml/2006/main" xmlns:mc="http://schemas.openxmlformats.org/markup-compatibility/2006" showMasterPhAnim="0" showMasterSp="1" show="1">
-  <p:cSld name="">
-    <p:spTree>
-      <p:nvGrpSpPr>
-        <p:cNvPr id="1" name=""/>
-        <p:cNvGrpSpPr/>
-        <p:nvPr/>
-      </p:nvGrpSpPr>
-      <p:grpSpPr bwMode="auto">
-        <a:xfrm>
-          <a:off x="0" y="0"/>
-          <a:ext cx="0" cy="0"/>
-          <a:chOff x="0" y="0"/>
-          <a:chExt cx="0" cy="0"/>
-        </a:xfrm>
-      </p:grpSpPr>
-      <p:sp>
-        <p:nvSpPr>
-          <p:cNvPr id="432310428" name="Title 1"/>
-          <p:cNvSpPr>
-            <a:spLocks noGrp="1"/>
-          </p:cNvSpPr>
-          <p:nvPr>
-            <p:ph type="title"/>
-          </p:nvPr>
-        </p:nvSpPr>
-        <p:spPr bwMode="auto"/>
-        <p:txBody>
-          <a:bodyPr/>
-          <a:lstStyle/>
-          <a:p>
-            <a:pPr>
-              <a:defRPr/>
-            </a:pPr>
-            <a:r>
-              <a:rPr lang="de-DE"/>
-              <a:t>Data Split</a:t>
-            </a:r>
-            <a:endParaRPr/>
-          </a:p>
-        </p:txBody>
-      </p:sp>
-      <p:sp>
-        <p:nvSpPr>
-          <p:cNvPr id="2054925275" name="Content Placeholder 2"/>
-          <p:cNvSpPr>
-            <a:spLocks noGrp="1"/>
-          </p:cNvSpPr>
-          <p:nvPr>
-            <p:ph idx="1"/>
-          </p:nvPr>
-        </p:nvSpPr>
-        <p:spPr bwMode="auto">
-          <a:xfrm flipH="0" flipV="0">
-            <a:off x="457199" y="1600199"/>
-            <a:ext cx="4114800" cy="4525962"/>
-          </a:xfrm>
-        </p:spPr>
-        <p:txBody>
-          <a:bodyPr/>
-          <a:lstStyle/>
-          <a:p>
-            <a:pPr>
-              <a:defRPr/>
-            </a:pPr>
-            <a:endParaRPr/>
-          </a:p>
-        </p:txBody>
-      </p:sp>
-      <p:sp>
-        <p:nvSpPr>
-          <p:cNvPr id="730378951" name=""/>
-          <p:cNvSpPr txBox="1"/>
-          <p:nvPr/>
-        </p:nvSpPr>
-        <p:spPr bwMode="auto">
-          <a:xfrm rot="0" flipH="0" flipV="0">
-            <a:off x="4852429" y="1557825"/>
-            <a:ext cx="3757307" cy="366119"/>
-          </a:xfrm>
-          <a:prstGeom prst="rect">
-            <a:avLst/>
-          </a:prstGeom>
-          <a:noFill/>
-        </p:spPr>
-        <p:txBody>
-          <a:bodyPr vertOverflow="overflow" horzOverflow="overflow" vert="horz" wrap="square" lIns="91440" tIns="45720" rIns="91440" bIns="45720" numCol="1" spcCol="0" rtlCol="0" fromWordArt="0" anchor="t" anchorCtr="0" forceAA="0" upright="0" compatLnSpc="0">
-            <a:spAutoFit/>
-          </a:bodyPr>
-          <a:p>
-            <a:pPr>
-              <a:defRPr/>
-            </a:pPr>
-            <a:endParaRPr/>
-          </a:p>
-        </p:txBody>
-      </p:sp>
-    </p:spTree>
-  </p:cSld>
-  <p:clrMapOvr>
-    <a:masterClrMapping/>
-  </p:clrMapOvr>
-  <mc:AlternateContent xmlns:mc="http://schemas.openxmlformats.org/markup-compatibility/2006">
-    <mc:Choice xmlns:p159="http://schemas.microsoft.com/office/powerpoint/2015/09/main" xmlns:p14="http://schemas.microsoft.com/office/powerpoint/2010/main" Requires="p159">
-      <p:transition p14:dur="2000" advClick="1"/>
-    </mc:Choice>
-    <mc:Fallback>
-      <p:transition advClick="1"/>
-    </mc:Fallback>
-  </mc:AlternateContent>
-</p:sld>
-</file>
-
-<file path=ppt/slides/slide7.xml><?xml version="1.0" encoding="utf-8"?>
-<p:sld xmlns:a="http://schemas.openxmlformats.org/drawingml/2006/main" xmlns:r="http://schemas.openxmlformats.org/officeDocument/2006/relationships" xmlns:p="http://schemas.openxmlformats.org/presentationml/2006/main" xmlns:m="http://schemas.openxmlformats.org/officeDocument/2006/math" xmlns:w="http://schemas.openxmlformats.org/wordprocessingml/2006/main" xmlns:mc="http://schemas.openxmlformats.org/markup-compatibility/2006" showMasterPhAnim="0" showMasterSp="1" show="1">
-  <p:cSld name="">
-    <p:spTree>
-      <p:nvGrpSpPr>
-        <p:cNvPr id="1" name=""/>
-        <p:cNvGrpSpPr/>
-        <p:nvPr/>
-      </p:nvGrpSpPr>
-      <p:grpSpPr bwMode="auto">
-        <a:xfrm>
-          <a:off x="0" y="0"/>
-          <a:ext cx="0" cy="0"/>
-          <a:chOff x="0" y="0"/>
-          <a:chExt cx="0" cy="0"/>
-        </a:xfrm>
-      </p:grpSpPr>
-      <p:sp>
-        <p:nvSpPr>
-          <p:cNvPr id="495304639" name="Title 1"/>
-          <p:cNvSpPr>
-            <a:spLocks noGrp="1"/>
-          </p:cNvSpPr>
-          <p:nvPr>
-            <p:ph type="title"/>
-          </p:nvPr>
-        </p:nvSpPr>
-        <p:spPr bwMode="auto">
-          <a:xfrm>
-            <a:off x="722313" y="4406899"/>
-            <a:ext cx="7772400" cy="1362074"/>
-          </a:xfrm>
-        </p:spPr>
-        <p:txBody>
-          <a:bodyPr/>
-          <a:lstStyle>
-            <a:lvl1pPr algn="l">
-              <a:defRPr sz="4000" b="1" cap="all"/>
-            </a:lvl1pPr>
-          </a:lstStyle>
-          <a:p>
-            <a:pPr>
-              <a:defRPr/>
-            </a:pPr>
-            <a:r>
-              <a:rPr lang="de-DE"/>
-              <a:t>Regression</a:t>
-            </a:r>
-            <a:endParaRPr/>
-          </a:p>
-        </p:txBody>
-      </p:sp>
-      <p:sp>
-        <p:nvSpPr>
-          <p:cNvPr id="430915594" name="Text Placeholder 2"/>
-          <p:cNvSpPr>
-            <a:spLocks noGrp="1"/>
-          </p:cNvSpPr>
-          <p:nvPr>
-            <p:ph type="body" idx="1"/>
-          </p:nvPr>
-        </p:nvSpPr>
-        <p:spPr bwMode="auto">
-          <a:xfrm>
-            <a:off x="722313" y="2906712"/>
-            <a:ext cx="7772400" cy="1500186"/>
-          </a:xfrm>
-        </p:spPr>
-        <p:txBody>
-          <a:bodyPr/>
-          <a:lstStyle>
-            <a:lvl1pPr marL="0" indent="0">
-              <a:buNone/>
-              <a:defRPr sz="2000">
-                <a:solidFill>
-                  <a:schemeClr val="tx1">
-                    <a:tint val="75000"/>
-                  </a:schemeClr>
-                </a:solidFill>
-              </a:defRPr>
-            </a:lvl1pPr>
-            <a:lvl2pPr marL="457200" indent="0">
-              <a:buNone/>
-              <a:defRPr sz="1800">
-                <a:solidFill>
-                  <a:schemeClr val="tx1">
-                    <a:tint val="75000"/>
-                  </a:schemeClr>
-                </a:solidFill>
-              </a:defRPr>
-            </a:lvl2pPr>
-            <a:lvl3pPr marL="914400" indent="0">
-              <a:buNone/>
-              <a:defRPr sz="1600">
-                <a:solidFill>
-                  <a:schemeClr val="tx1">
-                    <a:tint val="75000"/>
-                  </a:schemeClr>
-                </a:solidFill>
-              </a:defRPr>
-            </a:lvl3pPr>
-            <a:lvl4pPr marL="1371600" indent="0">
-              <a:buNone/>
-              <a:defRPr sz="1400">
-                <a:solidFill>
-                  <a:schemeClr val="tx1">
-                    <a:tint val="75000"/>
-                  </a:schemeClr>
-                </a:solidFill>
-              </a:defRPr>
-            </a:lvl4pPr>
-            <a:lvl5pPr marL="1828800" indent="0">
-              <a:buNone/>
-              <a:defRPr sz="1400">
-                <a:solidFill>
-                  <a:schemeClr val="tx1">
-                    <a:tint val="75000"/>
-                  </a:schemeClr>
-                </a:solidFill>
-              </a:defRPr>
-            </a:lvl5pPr>
-            <a:lvl6pPr marL="2286000" indent="0">
-              <a:buNone/>
-              <a:defRPr sz="1400">
-                <a:solidFill>
-                  <a:schemeClr val="tx1">
-                    <a:tint val="75000"/>
-                  </a:schemeClr>
-                </a:solidFill>
-              </a:defRPr>
-            </a:lvl6pPr>
-            <a:lvl7pPr marL="2743200" indent="0">
-              <a:buNone/>
-              <a:defRPr sz="1400">
-                <a:solidFill>
-                  <a:schemeClr val="tx1">
-                    <a:tint val="75000"/>
-                  </a:schemeClr>
-                </a:solidFill>
-              </a:defRPr>
-            </a:lvl7pPr>
-            <a:lvl8pPr marL="3200400" indent="0">
-              <a:buNone/>
-              <a:defRPr sz="1400">
-                <a:solidFill>
-                  <a:schemeClr val="tx1">
-                    <a:tint val="75000"/>
-                  </a:schemeClr>
-                </a:solidFill>
-              </a:defRPr>
-            </a:lvl8pPr>
-            <a:lvl9pPr marL="3657600" indent="0">
-              <a:buNone/>
-              <a:defRPr sz="1400">
-                <a:solidFill>
-                  <a:schemeClr val="tx1">
-                    <a:tint val="75000"/>
-                  </a:schemeClr>
-                </a:solidFill>
-              </a:defRPr>
-            </a:lvl9pPr>
-          </a:lstStyle>
-          <a:p>
             <a:pPr marL="305908" indent="-305908">
               <a:buFont typeface="Arial"/>
               <a:buChar char="–"/>
@@ -9005,89 +10123,6 @@
             <a:pPr marL="305908" indent="-305908">
               <a:buFont typeface="Arial"/>
               <a:buChar char="–"/>
-              <a:defRPr/>
-            </a:pPr>
-            <a:endParaRPr/>
-          </a:p>
-        </p:txBody>
-      </p:sp>
-    </p:spTree>
-  </p:cSld>
-  <p:clrMapOvr>
-    <a:masterClrMapping/>
-  </p:clrMapOvr>
-  <mc:AlternateContent xmlns:mc="http://schemas.openxmlformats.org/markup-compatibility/2006">
-    <mc:Choice xmlns:p159="http://schemas.microsoft.com/office/powerpoint/2015/09/main" xmlns:p14="http://schemas.microsoft.com/office/powerpoint/2010/main" Requires="p159">
-      <p:transition p14:dur="2000" advClick="1"/>
-    </mc:Choice>
-    <mc:Fallback>
-      <p:transition advClick="1"/>
-    </mc:Fallback>
-  </mc:AlternateContent>
-</p:sld>
-</file>
-
-<file path=ppt/slides/slide8.xml><?xml version="1.0" encoding="utf-8"?>
-<p:sld xmlns:a="http://schemas.openxmlformats.org/drawingml/2006/main" xmlns:r="http://schemas.openxmlformats.org/officeDocument/2006/relationships" xmlns:p="http://schemas.openxmlformats.org/presentationml/2006/main" xmlns:m="http://schemas.openxmlformats.org/officeDocument/2006/math" xmlns:w="http://schemas.openxmlformats.org/wordprocessingml/2006/main" xmlns:mc="http://schemas.openxmlformats.org/markup-compatibility/2006" showMasterPhAnim="0" showMasterSp="1" show="1">
-  <p:cSld name="">
-    <p:spTree>
-      <p:nvGrpSpPr>
-        <p:cNvPr id="1" name=""/>
-        <p:cNvGrpSpPr/>
-        <p:nvPr/>
-      </p:nvGrpSpPr>
-      <p:grpSpPr bwMode="auto">
-        <a:xfrm>
-          <a:off x="0" y="0"/>
-          <a:ext cx="0" cy="0"/>
-          <a:chOff x="0" y="0"/>
-          <a:chExt cx="0" cy="0"/>
-        </a:xfrm>
-      </p:grpSpPr>
-      <p:sp>
-        <p:nvSpPr>
-          <p:cNvPr id="5364576" name="Title 1"/>
-          <p:cNvSpPr>
-            <a:spLocks noGrp="1"/>
-          </p:cNvSpPr>
-          <p:nvPr>
-            <p:ph type="title"/>
-          </p:nvPr>
-        </p:nvSpPr>
-        <p:spPr bwMode="auto"/>
-        <p:txBody>
-          <a:bodyPr vertOverflow="overflow" horzOverflow="overflow" vert="horz" wrap="square" lIns="91440" tIns="45720" rIns="91440" bIns="45720" numCol="1" spcCol="0" rtlCol="0" fromWordArt="0" anchor="ctr" anchorCtr="0" forceAA="0" upright="0" compatLnSpc="0">
-            <a:normAutofit fontScale="90000" lnSpcReduction="2000"/>
-          </a:bodyPr>
-          <a:lstStyle/>
-          <a:p>
-            <a:pPr>
-              <a:defRPr/>
-            </a:pPr>
-            <a:r>
-              <a:rPr lang="de-DE"/>
-              <a:t>Demo 1: LinReg – White Wine Quality</a:t>
-            </a:r>
-            <a:endParaRPr/>
-          </a:p>
-        </p:txBody>
-      </p:sp>
-      <p:sp>
-        <p:nvSpPr>
-          <p:cNvPr id="763784150" name="Content Placeholder 2"/>
-          <p:cNvSpPr>
-            <a:spLocks noGrp="1"/>
-          </p:cNvSpPr>
-          <p:nvPr>
-            <p:ph idx="1"/>
-          </p:nvPr>
-        </p:nvSpPr>
-        <p:spPr bwMode="auto"/>
-        <p:txBody>
-          <a:bodyPr/>
-          <a:lstStyle/>
-          <a:p>
-            <a:pPr>
               <a:defRPr/>
             </a:pPr>
             <a:endParaRPr/>
@@ -9127,45 +10162,17 @@
           <a:chExt cx="0" cy="0"/>
         </a:xfrm>
       </p:grpSpPr>
-      <p:sp>
-        <p:nvSpPr>
-          <p:cNvPr id="59697093" name="Title 1"/>
-          <p:cNvSpPr>
-            <a:spLocks noGrp="1"/>
-          </p:cNvSpPr>
-          <p:nvPr>
-            <p:ph type="title"/>
-          </p:nvPr>
-        </p:nvSpPr>
-        <p:spPr bwMode="auto"/>
-        <p:txBody>
-          <a:bodyPr vertOverflow="overflow" horzOverflow="overflow" vert="horz" wrap="square" lIns="91440" tIns="45720" rIns="91440" bIns="45720" numCol="1" spcCol="0" rtlCol="0" fromWordArt="0" anchor="ctr" anchorCtr="0" forceAA="0" upright="0" compatLnSpc="0">
-            <a:normAutofit fontScale="90000" lnSpcReduction="2000"/>
-          </a:bodyPr>
-          <a:lstStyle/>
-          <a:p>
-            <a:pPr>
-              <a:defRPr/>
-            </a:pPr>
-            <a:r>
-              <a:rPr lang="de-DE"/>
-              <a:t>Task 1: LinReg - Oktoberfest Detective</a:t>
-            </a:r>
-            <a:endParaRPr/>
-          </a:p>
-        </p:txBody>
-      </p:sp>
       <p:graphicFrame>
         <p:nvGraphicFramePr>
-          <p:cNvPr id="1547432811" name=""/>
+          <p:cNvPr id="954245826" name=""/>
           <p:cNvGraphicFramePr>
             <a:graphicFrameLocks xmlns:a="http://schemas.openxmlformats.org/drawingml/2006/main"/>
           </p:cNvGraphicFramePr>
           <p:nvPr/>
         </p:nvGraphicFramePr>
         <p:xfrm>
-          <a:off x="1380226" y="1371600"/>
-          <a:ext cx="6108699" cy="3304539"/>
+          <a:off x="11905" y="6349"/>
+          <a:ext cx="6108699" cy="7516777"/>
         </p:xfrm>
         <a:graphic>
           <a:graphicData uri="http://schemas.openxmlformats.org/drawingml/2006/table">
@@ -9174,22 +10181,30 @@
                 <a:tableStyleId>{5C22544A-7EE6-4342-B048-85BDC9FD1C3A}</a:tableStyleId>
               </a:tblPr>
               <a:tblGrid>
-                <a:gridCol w="3047999"/>
-                <a:gridCol w="3047999"/>
+                <a:gridCol w="1440000"/>
+                <a:gridCol w="2700000"/>
+                <a:gridCol w="4980612"/>
               </a:tblGrid>
-              <a:tr h="365760">
-                <a:tc>
-                  <a:txBody>
-                    <a:bodyPr/>
-                    <a:p>
-                      <a:pPr>
-                        <a:defRPr/>
-                      </a:pPr>
-                      <a:r>
-                        <a:rPr lang="de-DE"/>
-                        <a:t>Columns</a:t>
-                      </a:r>
-                      <a:endParaRPr/>
+              <a:tr h="355875">
+                <a:tc>
+                  <a:txBody>
+                    <a:bodyPr/>
+                    <a:p>
+                      <a:pPr>
+                        <a:defRPr/>
+                      </a:pPr>
+                      <a:r>
+                        <a:rPr sz="2000" b="1" i="0" u="none">
+                          <a:solidFill>
+                            <a:srgbClr val="000000"/>
+                          </a:solidFill>
+                          <a:latin typeface="Times New Roman"/>
+                          <a:ea typeface="Times New Roman"/>
+                          <a:cs typeface="Times New Roman"/>
+                        </a:rPr>
+                        <a:t>Mode</a:t>
+                      </a:r>
+                      <a:endParaRPr sz="2000"/>
                     </a:p>
                   </a:txBody>
                   <a:tcPr/>
@@ -9202,28 +10217,65 @@
                         <a:defRPr/>
                       </a:pPr>
                       <a:r>
-                        <a:rPr lang="de-DE"/>
-                        <a:t>Unit</a:t>
-                      </a:r>
-                      <a:endParaRPr/>
+                        <a:rPr sz="2000" b="1" i="0" u="none">
+                          <a:solidFill>
+                            <a:srgbClr val="000000"/>
+                          </a:solidFill>
+                          <a:latin typeface="Times New Roman"/>
+                          <a:ea typeface="Times New Roman"/>
+                          <a:cs typeface="Times New Roman"/>
+                        </a:rPr>
+                        <a:t>Backend package</a:t>
+                      </a:r>
+                      <a:endParaRPr sz="2000"/>
                     </a:p>
                   </a:txBody>
                   <a:tcPr/>
                 </a:tc>
+                <a:tc>
+                  <a:txBody>
+                    <a:bodyPr/>
+                    <a:p>
+                      <a:pPr>
+                        <a:defRPr/>
+                      </a:pPr>
+                      <a:r>
+                        <a:rPr sz="2000" b="1" i="0" u="none">
+                          <a:solidFill>
+                            <a:srgbClr val="000000"/>
+                          </a:solidFill>
+                          <a:latin typeface="Times New Roman"/>
+                          <a:ea typeface="Times New Roman"/>
+                          <a:cs typeface="Times New Roman"/>
+                        </a:rPr>
+                        <a:t>Notes</a:t>
+                      </a:r>
+                      <a:endParaRPr sz="2000"/>
+                    </a:p>
+                  </a:txBody>
+                  <a:tcPr/>
+                </a:tc>
               </a:tr>
-              <a:tr h="365760">
-                <a:tc>
-                  <a:txBody>
-                    <a:bodyPr/>
-                    <a:p>
-                      <a:pPr>
-                        <a:defRPr/>
-                      </a:pPr>
-                      <a:r>
-                        <a:rPr lang="de-DE"/>
-                        <a:t>jahr</a:t>
-                      </a:r>
-                      <a:endParaRPr/>
+              <a:tr h="851064">
+                <a:tc>
+                  <a:txBody>
+                    <a:bodyPr/>
+                    <a:p>
+                      <a:pPr>
+                        <a:defRPr/>
+                      </a:pPr>
+                      <a:r>
+                        <a:rPr sz="2000" b="0" i="0" u="none">
+                          <a:solidFill>
+                            <a:srgbClr val="000000"/>
+                          </a:solidFill>
+                          <a:latin typeface="Times New Roman"/>
+                          <a:ea typeface="Times New Roman"/>
+                          <a:cs typeface="Times New Roman"/>
+                        </a:rPr>
+                        <a:t>regression</a:t>
+                      </a:r>
+                      <a:endParaRPr sz="2000"/>
                     </a:p>
                   </a:txBody>
                   <a:tcPr/>
@@ -9236,28 +10288,87 @@
                         <a:defRPr/>
                       </a:pPr>
                       <a:r>
-                        <a:rPr lang="de-DE"/>
-                        <a:t>-</a:t>
-                      </a:r>
-                      <a:endParaRPr/>
+                        <a:rPr sz="2000" b="1" i="0" u="none">
+                          <a:solidFill>
+                            <a:srgbClr val="000000"/>
+                          </a:solidFill>
+                          <a:latin typeface="Times New Roman"/>
+                          <a:ea typeface="Times New Roman"/>
+                          <a:cs typeface="Times New Roman"/>
+                        </a:rPr>
+                        <a:t>stats::lm</a:t>
+                      </a:r>
+                      <a:endParaRPr sz="2000"/>
                     </a:p>
                   </a:txBody>
                   <a:tcPr/>
                 </a:tc>
+                <a:tc>
+                  <a:txBody>
+                    <a:bodyPr/>
+                    <a:p>
+                      <a:pPr>
+                        <a:defRPr/>
+                      </a:pPr>
+                      <a:r>
+                        <a:rPr sz="2000" b="0" i="0" u="none">
+                          <a:solidFill>
+                            <a:srgbClr val="000000"/>
+                          </a:solidFill>
+                          <a:latin typeface="Times New Roman"/>
+                          <a:ea typeface="Times New Roman"/>
+                          <a:cs typeface="Times New Roman"/>
+                        </a:rPr>
+                        <a:t>The base R linear model (</a:t>
+                      </a:r>
+                      <a:r>
+                        <a:rPr sz="2000" b="0" i="0" u="none">
+                          <a:solidFill>
+                            <a:srgbClr val="000000"/>
+                          </a:solidFill>
+                          <a:latin typeface="Courier New"/>
+                          <a:ea typeface="Courier New"/>
+                          <a:cs typeface="Courier New"/>
+                        </a:rPr>
+                        <a:t>lm()</a:t>
+                      </a:r>
+                      <a:r>
+                        <a:rPr sz="2000" b="0" i="0" u="none">
+                          <a:solidFill>
+                            <a:srgbClr val="000000"/>
+                          </a:solidFill>
+                          <a:latin typeface="Times New Roman"/>
+                          <a:ea typeface="Times New Roman"/>
+                          <a:cs typeface="Times New Roman"/>
+                        </a:rPr>
+                        <a:t>), ordinary least squares regression.</a:t>
+                      </a:r>
+                      <a:endParaRPr sz="2000"/>
+                    </a:p>
+                  </a:txBody>
+                  <a:tcPr/>
+                </a:tc>
               </a:tr>
-              <a:tr h="365760">
-                <a:tc>
-                  <a:txBody>
-                    <a:bodyPr/>
-                    <a:p>
-                      <a:pPr>
-                        <a:defRPr/>
-                      </a:pPr>
-                      <a:r>
-                        <a:rPr lang="de-DE"/>
-                        <a:t>dauer</a:t>
-                      </a:r>
-                      <a:endParaRPr/>
+              <a:tr h="870819">
+                <a:tc>
+                  <a:txBody>
+                    <a:bodyPr/>
+                    <a:p>
+                      <a:pPr>
+                        <a:defRPr/>
+                      </a:pPr>
+                      <a:r>
+                        <a:rPr sz="2000" b="0" i="0" u="none">
+                          <a:solidFill>
+                            <a:srgbClr val="000000"/>
+                          </a:solidFill>
+                          <a:latin typeface="Times New Roman"/>
+                          <a:ea typeface="Times New Roman"/>
+                          <a:cs typeface="Times New Roman"/>
+                        </a:rPr>
+                        <a:t>regression</a:t>
+                      </a:r>
+                      <a:endParaRPr sz="2000"/>
                     </a:p>
                   </a:txBody>
                   <a:tcPr/>
@@ -9270,28 +10381,65 @@
                         <a:defRPr/>
                       </a:pPr>
                       <a:r>
-                        <a:rPr lang="de-DE"/>
-                        <a:t>days</a:t>
-                      </a:r>
-                      <a:endParaRPr/>
+                        <a:rPr sz="2000" b="1" i="0" u="none">
+                          <a:solidFill>
+                            <a:srgbClr val="000000"/>
+                          </a:solidFill>
+                          <a:latin typeface="Times New Roman"/>
+                          <a:ea typeface="Times New Roman"/>
+                          <a:cs typeface="Times New Roman"/>
+                        </a:rPr>
+                        <a:t>stats::glm</a:t>
+                      </a:r>
+                      <a:endParaRPr sz="2000"/>
                     </a:p>
                   </a:txBody>
                   <a:tcPr/>
                 </a:tc>
+                <a:tc>
+                  <a:txBody>
+                    <a:bodyPr/>
+                    <a:p>
+                      <a:pPr>
+                        <a:defRPr/>
+                      </a:pPr>
+                      <a:r>
+                        <a:rPr sz="2000" b="0" i="0" u="none">
+                          <a:solidFill>
+                            <a:srgbClr val="000000"/>
+                          </a:solidFill>
+                          <a:latin typeface="Times New Roman"/>
+                          <a:ea typeface="Times New Roman"/>
+                          <a:cs typeface="Times New Roman"/>
+                        </a:rPr>
+                        <a:t>Generalized linear model, allows different families (e.g. Gaussian, binomial).</a:t>
+                      </a:r>
+                      <a:endParaRPr sz="2000"/>
+                    </a:p>
+                  </a:txBody>
+                  <a:tcPr/>
+                </a:tc>
               </a:tr>
-              <a:tr h="365760">
-                <a:tc>
-                  <a:txBody>
-                    <a:bodyPr/>
-                    <a:p>
-                      <a:pPr>
-                        <a:defRPr/>
-                      </a:pPr>
-                      <a:r>
-                        <a:rPr lang="de-DE"/>
-                        <a:t>besucher_gesamt</a:t>
-                      </a:r>
-                      <a:endParaRPr/>
+              <a:tr h="870819">
+                <a:tc>
+                  <a:txBody>
+                    <a:bodyPr/>
+                    <a:p>
+                      <a:pPr>
+                        <a:defRPr/>
+                      </a:pPr>
+                      <a:r>
+                        <a:rPr sz="2000" b="0" i="0" u="none">
+                          <a:solidFill>
+                            <a:srgbClr val="000000"/>
+                          </a:solidFill>
+                          <a:latin typeface="Times New Roman"/>
+                          <a:ea typeface="Times New Roman"/>
+                          <a:cs typeface="Times New Roman"/>
+                        </a:rPr>
+                        <a:t>regression</a:t>
+                      </a:r>
+                      <a:endParaRPr sz="2000"/>
                     </a:p>
                   </a:txBody>
                   <a:tcPr/>
@@ -9304,28 +10452,87 @@
                         <a:defRPr/>
                       </a:pPr>
                       <a:r>
-                        <a:rPr lang="de-DE"/>
-                        <a:t>millions</a:t>
-                      </a:r>
-                      <a:endParaRPr/>
+                        <a:rPr sz="2000" b="1" i="0" u="none">
+                          <a:solidFill>
+                            <a:srgbClr val="000000"/>
+                          </a:solidFill>
+                          <a:latin typeface="Times New Roman"/>
+                          <a:ea typeface="Times New Roman"/>
+                          <a:cs typeface="Times New Roman"/>
+                        </a:rPr>
+                        <a:t>glmnet</a:t>
+                      </a:r>
+                      <a:r>
+                        <a:rPr lang="de-DE" sz="2000" b="1" i="0" u="none">
+                          <a:solidFill>
+                            <a:srgbClr val="000000"/>
+                          </a:solidFill>
+                          <a:latin typeface="Times New Roman"/>
+                          <a:ea typeface="Times New Roman"/>
+                          <a:cs typeface="Times New Roman"/>
+                        </a:rPr>
+                        <a:t>::</a:t>
+                      </a:r>
+                      <a:r>
+                        <a:rPr lang="en-US" sz="2000" b="1" i="0" u="none" strike="noStrike" cap="none" spc="0">
+                          <a:solidFill>
+                            <a:srgbClr val="000000"/>
+                          </a:solidFill>
+                          <a:latin typeface="Times New Roman"/>
+                          <a:ea typeface="Times New Roman"/>
+                          <a:cs typeface="Times New Roman"/>
+                        </a:rPr>
+                        <a:t>glmnet</a:t>
+                      </a:r>
+                      <a:endParaRPr sz="2000"/>
                     </a:p>
                   </a:txBody>
                   <a:tcPr/>
                 </a:tc>
+                <a:tc>
+                  <a:txBody>
+                    <a:bodyPr/>
+                    <a:p>
+                      <a:pPr>
+                        <a:defRPr/>
+                      </a:pPr>
+                      <a:r>
+                        <a:rPr sz="2000" b="0" i="0" u="none">
+                          <a:solidFill>
+                            <a:srgbClr val="000000"/>
+                          </a:solidFill>
+                          <a:latin typeface="Times New Roman"/>
+                          <a:ea typeface="Times New Roman"/>
+                          <a:cs typeface="Times New Roman"/>
+                        </a:rPr>
+                        <a:t>Regularized regression (LASSO, ridge, elastic net). Efficient for high-dimensional data.</a:t>
+                      </a:r>
+                      <a:endParaRPr sz="2000"/>
+                    </a:p>
+                  </a:txBody>
+                  <a:tcPr/>
+                </a:tc>
               </a:tr>
-              <a:tr h="365760">
-                <a:tc>
-                  <a:txBody>
-                    <a:bodyPr/>
-                    <a:p>
-                      <a:pPr>
-                        <a:defRPr/>
-                      </a:pPr>
-                      <a:r>
-                        <a:rPr lang="de-DE"/>
-                        <a:t>besucher_tag</a:t>
-                      </a:r>
-                      <a:endParaRPr/>
+              <a:tr h="777476">
+                <a:tc>
+                  <a:txBody>
+                    <a:bodyPr/>
+                    <a:p>
+                      <a:pPr>
+                        <a:defRPr/>
+                      </a:pPr>
+                      <a:r>
+                        <a:rPr sz="2000" b="0" i="0" u="none">
+                          <a:solidFill>
+                            <a:srgbClr val="000000"/>
+                          </a:solidFill>
+                          <a:latin typeface="Times New Roman"/>
+                          <a:ea typeface="Times New Roman"/>
+                          <a:cs typeface="Times New Roman"/>
+                        </a:rPr>
+                        <a:t>regression</a:t>
+                      </a:r>
+                      <a:endParaRPr sz="2000"/>
                     </a:p>
                   </a:txBody>
                   <a:tcPr/>
@@ -9338,28 +10545,76 @@
                         <a:defRPr/>
                       </a:pPr>
                       <a:r>
-                        <a:rPr lang="de-DE"/>
-                        <a:t>thousands</a:t>
-                      </a:r>
-                      <a:endParaRPr/>
+                        <a:rPr sz="2000" b="1" i="0" u="none">
+                          <a:solidFill>
+                            <a:srgbClr val="000000"/>
+                          </a:solidFill>
+                          <a:latin typeface="Times New Roman"/>
+                          <a:ea typeface="Times New Roman"/>
+                          <a:cs typeface="Times New Roman"/>
+                        </a:rPr>
+                        <a:t>rstanar</a:t>
+                      </a:r>
+                      <a:r>
+                        <a:rPr lang="de-DE" sz="2000" b="1" i="0" u="none">
+                          <a:solidFill>
+                            <a:srgbClr val="000000"/>
+                          </a:solidFill>
+                          <a:latin typeface="Times New Roman"/>
+                          <a:ea typeface="Times New Roman"/>
+                          <a:cs typeface="Times New Roman"/>
+                        </a:rPr>
+                        <a:t>m::stan_...</a:t>
+                      </a:r>
+                      <a:endParaRPr sz="2000"/>
                     </a:p>
                   </a:txBody>
                   <a:tcPr/>
                 </a:tc>
+                <a:tc>
+                  <a:txBody>
+                    <a:bodyPr/>
+                    <a:p>
+                      <a:pPr>
+                        <a:defRPr/>
+                      </a:pPr>
+                      <a:r>
+                        <a:rPr sz="2000" b="0" i="0" u="none">
+                          <a:solidFill>
+                            <a:srgbClr val="000000"/>
+                          </a:solidFill>
+                          <a:latin typeface="Times New Roman"/>
+                          <a:ea typeface="Times New Roman"/>
+                          <a:cs typeface="Times New Roman"/>
+                        </a:rPr>
+                        <a:t>Bayesian regression using Stan; produces full posterior distributions.</a:t>
+                      </a:r>
+                      <a:endParaRPr sz="2000"/>
+                    </a:p>
+                  </a:txBody>
+                  <a:tcPr/>
+                </a:tc>
               </a:tr>
-              <a:tr h="365760">
-                <a:tc>
-                  <a:txBody>
-                    <a:bodyPr/>
-                    <a:p>
-                      <a:pPr>
-                        <a:defRPr/>
-                      </a:pPr>
-                      <a:r>
-                        <a:rPr lang="de-DE"/>
-                        <a:t>bier_preis</a:t>
-                      </a:r>
-                      <a:endParaRPr/>
+              <a:tr h="777476">
+                <a:tc>
+                  <a:txBody>
+                    <a:bodyPr/>
+                    <a:p>
+                      <a:pPr>
+                        <a:defRPr/>
+                      </a:pPr>
+                      <a:r>
+                        <a:rPr sz="2000" b="0" i="0" u="none">
+                          <a:solidFill>
+                            <a:srgbClr val="000000"/>
+                          </a:solidFill>
+                          <a:latin typeface="Times New Roman"/>
+                          <a:ea typeface="Times New Roman"/>
+                          <a:cs typeface="Times New Roman"/>
+                        </a:rPr>
+                        <a:t>regression</a:t>
+                      </a:r>
+                      <a:endParaRPr sz="2000"/>
                     </a:p>
                   </a:txBody>
                   <a:tcPr/>
@@ -9372,28 +10627,65 @@
                         <a:defRPr/>
                       </a:pPr>
                       <a:r>
-                        <a:rPr lang="de-DE"/>
-                        <a:t>Euro per 1 Liter</a:t>
-                      </a:r>
-                      <a:endParaRPr/>
+                        <a:rPr sz="2000" b="1" i="0" u="none">
+                          <a:solidFill>
+                            <a:srgbClr val="000000"/>
+                          </a:solidFill>
+                          <a:latin typeface="Times New Roman"/>
+                          <a:ea typeface="Times New Roman"/>
+                          <a:cs typeface="Times New Roman"/>
+                        </a:rPr>
+                        <a:t>sparklyr</a:t>
+                      </a:r>
+                      <a:endParaRPr sz="2000"/>
                     </a:p>
                   </a:txBody>
                   <a:tcPr/>
                 </a:tc>
+                <a:tc>
+                  <a:txBody>
+                    <a:bodyPr/>
+                    <a:p>
+                      <a:pPr>
+                        <a:defRPr/>
+                      </a:pPr>
+                      <a:r>
+                        <a:rPr sz="2000" b="0" i="0" u="none">
+                          <a:solidFill>
+                            <a:srgbClr val="000000"/>
+                          </a:solidFill>
+                          <a:latin typeface="Times New Roman"/>
+                          <a:ea typeface="Times New Roman"/>
+                          <a:cs typeface="Times New Roman"/>
+                        </a:rPr>
+                        <a:t>Runs linear regression on Spark clusters, useful for large-scale data.</a:t>
+                      </a:r>
+                      <a:endParaRPr sz="2000"/>
+                    </a:p>
+                  </a:txBody>
+                  <a:tcPr/>
+                </a:tc>
               </a:tr>
-              <a:tr h="365760">
-                <a:tc>
-                  <a:txBody>
-                    <a:bodyPr/>
-                    <a:p>
-                      <a:pPr>
-                        <a:defRPr/>
-                      </a:pPr>
-                      <a:r>
-                        <a:rPr lang="de-DE"/>
-                        <a:t>bier_konsum</a:t>
-                      </a:r>
-                      <a:endParaRPr/>
+              <a:tr h="723635">
+                <a:tc>
+                  <a:txBody>
+                    <a:bodyPr/>
+                    <a:p>
+                      <a:pPr>
+                        <a:defRPr/>
+                      </a:pPr>
+                      <a:r>
+                        <a:rPr sz="2000" b="0" i="0" u="none">
+                          <a:solidFill>
+                            <a:srgbClr val="000000"/>
+                          </a:solidFill>
+                          <a:latin typeface="Times New Roman"/>
+                          <a:ea typeface="Times New Roman"/>
+                          <a:cs typeface="Times New Roman"/>
+                        </a:rPr>
+                        <a:t>regression</a:t>
+                      </a:r>
+                      <a:endParaRPr sz="2000"/>
                     </a:p>
                   </a:txBody>
                   <a:tcPr/>
@@ -9406,28 +10698,65 @@
                         <a:defRPr/>
                       </a:pPr>
                       <a:r>
-                        <a:rPr lang="de-DE"/>
-                        <a:t>hectoliter</a:t>
-                      </a:r>
-                      <a:endParaRPr/>
+                        <a:rPr sz="2000" b="1" i="0" u="none">
+                          <a:solidFill>
+                            <a:srgbClr val="000000"/>
+                          </a:solidFill>
+                          <a:latin typeface="Times New Roman"/>
+                          <a:ea typeface="Times New Roman"/>
+                          <a:cs typeface="Times New Roman"/>
+                        </a:rPr>
+                        <a:t>keras</a:t>
+                      </a:r>
+                      <a:endParaRPr sz="2000"/>
                     </a:p>
                   </a:txBody>
                   <a:tcPr/>
                 </a:tc>
+                <a:tc>
+                  <a:txBody>
+                    <a:bodyPr/>
+                    <a:p>
+                      <a:pPr>
+                        <a:defRPr/>
+                      </a:pPr>
+                      <a:r>
+                        <a:rPr sz="2000" b="0" i="0" u="none">
+                          <a:solidFill>
+                            <a:srgbClr val="000000"/>
+                          </a:solidFill>
+                          <a:latin typeface="Times New Roman"/>
+                          <a:ea typeface="Times New Roman"/>
+                          <a:cs typeface="Times New Roman"/>
+                        </a:rPr>
+                        <a:t>Neural network regression with TensorFlow/Keras backend.</a:t>
+                      </a:r>
+                      <a:endParaRPr sz="2000"/>
+                    </a:p>
+                  </a:txBody>
+                  <a:tcPr/>
+                </a:tc>
               </a:tr>
-              <a:tr h="365760">
-                <a:tc>
-                  <a:txBody>
-                    <a:bodyPr/>
-                    <a:p>
-                      <a:pPr>
-                        <a:defRPr/>
-                      </a:pPr>
-                      <a:r>
-                        <a:rPr lang="de-DE"/>
-                        <a:t>hendl_preis</a:t>
-                      </a:r>
-                      <a:endParaRPr/>
+              <a:tr h="777476">
+                <a:tc>
+                  <a:txBody>
+                    <a:bodyPr/>
+                    <a:p>
+                      <a:pPr>
+                        <a:defRPr/>
+                      </a:pPr>
+                      <a:r>
+                        <a:rPr sz="2000" b="0" i="0" u="none">
+                          <a:solidFill>
+                            <a:srgbClr val="000000"/>
+                          </a:solidFill>
+                          <a:latin typeface="Times New Roman"/>
+                          <a:ea typeface="Times New Roman"/>
+                          <a:cs typeface="Times New Roman"/>
+                        </a:rPr>
+                        <a:t>regression</a:t>
+                      </a:r>
+                      <a:endParaRPr sz="2000"/>
                     </a:p>
                   </a:txBody>
                   <a:tcPr/>
@@ -9440,28 +10769,65 @@
                         <a:defRPr/>
                       </a:pPr>
                       <a:r>
-                        <a:rPr lang="de-DE"/>
-                        <a:t>Euro</a:t>
-                      </a:r>
-                      <a:endParaRPr/>
+                        <a:rPr sz="2000" b="1" i="0" u="none">
+                          <a:solidFill>
+                            <a:srgbClr val="000000"/>
+                          </a:solidFill>
+                          <a:latin typeface="Times New Roman"/>
+                          <a:ea typeface="Times New Roman"/>
+                          <a:cs typeface="Times New Roman"/>
+                        </a:rPr>
+                        <a:t>brulee</a:t>
+                      </a:r>
+                      <a:endParaRPr sz="2000"/>
                     </a:p>
                   </a:txBody>
                   <a:tcPr/>
                 </a:tc>
+                <a:tc>
+                  <a:txBody>
+                    <a:bodyPr/>
+                    <a:p>
+                      <a:pPr>
+                        <a:defRPr/>
+                      </a:pPr>
+                      <a:r>
+                        <a:rPr sz="2000" b="0" i="0" u="none">
+                          <a:solidFill>
+                            <a:srgbClr val="000000"/>
+                          </a:solidFill>
+                          <a:latin typeface="Times New Roman"/>
+                          <a:ea typeface="Times New Roman"/>
+                          <a:cs typeface="Times New Roman"/>
+                        </a:rPr>
+                        <a:t>Torch-based neural networks (alternative to keras, integrates with tidymodels).</a:t>
+                      </a:r>
+                      <a:endParaRPr sz="2000"/>
+                    </a:p>
+                  </a:txBody>
+                  <a:tcPr/>
+                </a:tc>
               </a:tr>
-              <a:tr h="365760">
-                <a:tc>
-                  <a:txBody>
-                    <a:bodyPr/>
-                    <a:p>
-                      <a:pPr>
-                        <a:defRPr/>
-                      </a:pPr>
-                      <a:r>
-                        <a:rPr lang="de-DE"/>
-                        <a:t>hendl_konsum</a:t>
-                      </a:r>
-                      <a:endParaRPr/>
+              <a:tr h="870819">
+                <a:tc>
+                  <a:txBody>
+                    <a:bodyPr/>
+                    <a:p>
+                      <a:pPr>
+                        <a:defRPr/>
+                      </a:pPr>
+                      <a:r>
+                        <a:rPr sz="2000" b="0" i="0" u="none">
+                          <a:solidFill>
+                            <a:srgbClr val="000000"/>
+                          </a:solidFill>
+                          <a:latin typeface="Times New Roman"/>
+                          <a:ea typeface="Times New Roman"/>
+                          <a:cs typeface="Times New Roman"/>
+                        </a:rPr>
+                        <a:t>quantile regression</a:t>
+                      </a:r>
+                      <a:endParaRPr sz="2000"/>
                     </a:p>
                   </a:txBody>
                   <a:tcPr/>
@@ -9474,10 +10840,40 @@
                         <a:defRPr/>
                       </a:pPr>
                       <a:r>
-                        <a:rPr lang="de-DE"/>
-                        <a:t>count</a:t>
-                      </a:r>
-                      <a:endParaRPr/>
+                        <a:rPr sz="2000" b="1" i="0" u="none">
+                          <a:solidFill>
+                            <a:srgbClr val="000000"/>
+                          </a:solidFill>
+                          <a:latin typeface="Times New Roman"/>
+                          <a:ea typeface="Times New Roman"/>
+                          <a:cs typeface="Times New Roman"/>
+                        </a:rPr>
+                        <a:t>quantreg</a:t>
+                      </a:r>
+                      <a:endParaRPr sz="2000"/>
+                    </a:p>
+                  </a:txBody>
+                  <a:tcPr/>
+                </a:tc>
+                <a:tc>
+                  <a:txBody>
+                    <a:bodyPr/>
+                    <a:p>
+                      <a:pPr>
+                        <a:defRPr/>
+                      </a:pPr>
+                      <a:r>
+                        <a:rPr sz="2000" b="0" i="0" u="none">
+                          <a:solidFill>
+                            <a:srgbClr val="000000"/>
+                          </a:solidFill>
+                          <a:latin typeface="Times New Roman"/>
+                          <a:ea typeface="Times New Roman"/>
+                          <a:cs typeface="Times New Roman"/>
+                        </a:rPr>
+                        <a:t>Fits quantile regression models (predict conditional quantiles, not just the mean).</a:t>
+                      </a:r>
+                      <a:endParaRPr sz="2000"/>
                     </a:p>
                   </a:txBody>
                   <a:tcPr/>

</xml_diff>